<commit_message>
acpt: update sld-access-shapes for GraphicFrame
“table” and “chart” and “smart art” shapes accessed using Slide.shapes
should be GraphicFrame rather than Table, Chart, or SmartArt. The
latter are enclosed graphical objects, the GraphicFrame instance is
always the enclosing shape, having the id, name, size, and other common
shape properties.
</commit_message>
<xml_diff>
--- a/features/steps/test_files/sld-access-shapes.pptx
+++ b/features/steps/test_files/sld-access-shapes.pptx
@@ -105,6 +105,2809 @@
     </a:lvl9pPr>
   </p:defaultTextStyle>
 </p:presentation>
+</file>
+
+<file path=ppt/charts/chart1.xml><?xml version="1.0" encoding="utf-8"?>
+<c:chartSpace xmlns:c="http://schemas.openxmlformats.org/drawingml/2006/chart" xmlns:a="http://schemas.openxmlformats.org/drawingml/2006/main" xmlns:r="http://schemas.openxmlformats.org/officeDocument/2006/relationships">
+  <c:date1904 val="0"/>
+  <c:lang val="en-US"/>
+  <c:roundedCorners val="0"/>
+  <mc:AlternateContent xmlns:mc="http://schemas.openxmlformats.org/markup-compatibility/2006">
+    <mc:Choice xmlns:c14="http://schemas.microsoft.com/office/drawing/2007/8/2/chart" Requires="c14">
+      <c14:style val="118"/>
+    </mc:Choice>
+    <mc:Fallback>
+      <c:style val="18"/>
+    </mc:Fallback>
+  </mc:AlternateContent>
+  <c:chart>
+    <c:title>
+      <c:tx>
+        <c:rich>
+          <a:bodyPr/>
+          <a:lstStyle/>
+          <a:p>
+            <a:pPr>
+              <a:defRPr/>
+            </a:pPr>
+            <a:r>
+              <a:rPr lang="en-US" dirty="0" smtClean="0"/>
+              <a:t>shapes[4]</a:t>
+            </a:r>
+            <a:endParaRPr lang="en-US" dirty="0"/>
+          </a:p>
+        </c:rich>
+      </c:tx>
+      <c:layout/>
+      <c:overlay val="0"/>
+    </c:title>
+    <c:autoTitleDeleted val="0"/>
+    <c:plotArea>
+      <c:layout/>
+      <c:pieChart>
+        <c:varyColors val="1"/>
+        <c:ser>
+          <c:idx val="0"/>
+          <c:order val="0"/>
+          <c:tx>
+            <c:strRef>
+              <c:f>Sheet1!$B$1</c:f>
+              <c:strCache>
+                <c:ptCount val="1"/>
+                <c:pt idx="0">
+                  <c:v>Sales</c:v>
+                </c:pt>
+              </c:strCache>
+            </c:strRef>
+          </c:tx>
+          <c:cat>
+            <c:strRef>
+              <c:f>Sheet1!$A$2:$A$5</c:f>
+              <c:strCache>
+                <c:ptCount val="4"/>
+                <c:pt idx="0">
+                  <c:v>1st Qtr</c:v>
+                </c:pt>
+                <c:pt idx="1">
+                  <c:v>2nd Qtr</c:v>
+                </c:pt>
+                <c:pt idx="2">
+                  <c:v>3rd Qtr</c:v>
+                </c:pt>
+                <c:pt idx="3">
+                  <c:v>4th Qtr</c:v>
+                </c:pt>
+              </c:strCache>
+            </c:strRef>
+          </c:cat>
+          <c:val>
+            <c:numRef>
+              <c:f>Sheet1!$B$2:$B$5</c:f>
+              <c:numCache>
+                <c:formatCode>General</c:formatCode>
+                <c:ptCount val="4"/>
+                <c:pt idx="0">
+                  <c:v>8.2</c:v>
+                </c:pt>
+                <c:pt idx="1">
+                  <c:v>3.2</c:v>
+                </c:pt>
+                <c:pt idx="2">
+                  <c:v>1.4</c:v>
+                </c:pt>
+                <c:pt idx="3">
+                  <c:v>1.2</c:v>
+                </c:pt>
+              </c:numCache>
+            </c:numRef>
+          </c:val>
+        </c:ser>
+        <c:dLbls>
+          <c:showLegendKey val="0"/>
+          <c:showVal val="0"/>
+          <c:showCatName val="0"/>
+          <c:showSerName val="0"/>
+          <c:showPercent val="0"/>
+          <c:showBubbleSize val="0"/>
+          <c:showLeaderLines val="1"/>
+        </c:dLbls>
+        <c:firstSliceAng val="0"/>
+      </c:pieChart>
+    </c:plotArea>
+    <c:legend>
+      <c:legendPos val="r"/>
+      <c:layout/>
+      <c:overlay val="0"/>
+    </c:legend>
+    <c:plotVisOnly val="1"/>
+    <c:dispBlanksAs val="gap"/>
+    <c:showDLblsOverMax val="0"/>
+  </c:chart>
+  <c:txPr>
+    <a:bodyPr/>
+    <a:lstStyle/>
+    <a:p>
+      <a:pPr>
+        <a:defRPr sz="1800"/>
+      </a:pPr>
+      <a:endParaRPr lang="en-US"/>
+    </a:p>
+  </c:txPr>
+  <c:externalData r:id="rId1">
+    <c:autoUpdate val="0"/>
+  </c:externalData>
+</c:chartSpace>
+</file>
+
+<file path=ppt/diagrams/colors1.xml><?xml version="1.0" encoding="utf-8"?>
+<dgm:colorsDef xmlns:dgm="http://schemas.openxmlformats.org/drawingml/2006/diagram" xmlns:a="http://schemas.openxmlformats.org/drawingml/2006/main" uniqueId="urn:microsoft.com/office/officeart/2005/8/colors/accent1_2">
+  <dgm:title val=""/>
+  <dgm:desc val=""/>
+  <dgm:catLst>
+    <dgm:cat type="accent1" pri="11200"/>
+  </dgm:catLst>
+  <dgm:styleLbl name="node0">
+    <dgm:fillClrLst meth="repeat">
+      <a:schemeClr val="accent1"/>
+    </dgm:fillClrLst>
+    <dgm:linClrLst meth="repeat">
+      <a:schemeClr val="lt1"/>
+    </dgm:linClrLst>
+    <dgm:effectClrLst/>
+    <dgm:txLinClrLst/>
+    <dgm:txFillClrLst/>
+    <dgm:txEffectClrLst/>
+  </dgm:styleLbl>
+  <dgm:styleLbl name="alignNode1">
+    <dgm:fillClrLst meth="repeat">
+      <a:schemeClr val="accent1"/>
+    </dgm:fillClrLst>
+    <dgm:linClrLst meth="repeat">
+      <a:schemeClr val="accent1"/>
+    </dgm:linClrLst>
+    <dgm:effectClrLst/>
+    <dgm:txLinClrLst/>
+    <dgm:txFillClrLst/>
+    <dgm:txEffectClrLst/>
+  </dgm:styleLbl>
+  <dgm:styleLbl name="node1">
+    <dgm:fillClrLst meth="repeat">
+      <a:schemeClr val="accent1"/>
+    </dgm:fillClrLst>
+    <dgm:linClrLst meth="repeat">
+      <a:schemeClr val="lt1"/>
+    </dgm:linClrLst>
+    <dgm:effectClrLst/>
+    <dgm:txLinClrLst/>
+    <dgm:txFillClrLst/>
+    <dgm:txEffectClrLst/>
+  </dgm:styleLbl>
+  <dgm:styleLbl name="lnNode1">
+    <dgm:fillClrLst meth="repeat">
+      <a:schemeClr val="accent1"/>
+    </dgm:fillClrLst>
+    <dgm:linClrLst meth="repeat">
+      <a:schemeClr val="lt1"/>
+    </dgm:linClrLst>
+    <dgm:effectClrLst/>
+    <dgm:txLinClrLst/>
+    <dgm:txFillClrLst/>
+    <dgm:txEffectClrLst/>
+  </dgm:styleLbl>
+  <dgm:styleLbl name="vennNode1">
+    <dgm:fillClrLst meth="repeat">
+      <a:schemeClr val="accent1">
+        <a:alpha val="50000"/>
+      </a:schemeClr>
+    </dgm:fillClrLst>
+    <dgm:linClrLst meth="repeat">
+      <a:schemeClr val="lt1"/>
+    </dgm:linClrLst>
+    <dgm:effectClrLst/>
+    <dgm:txLinClrLst/>
+    <dgm:txFillClrLst/>
+    <dgm:txEffectClrLst/>
+  </dgm:styleLbl>
+  <dgm:styleLbl name="node2">
+    <dgm:fillClrLst meth="repeat">
+      <a:schemeClr val="accent1"/>
+    </dgm:fillClrLst>
+    <dgm:linClrLst meth="repeat">
+      <a:schemeClr val="lt1"/>
+    </dgm:linClrLst>
+    <dgm:effectClrLst/>
+    <dgm:txLinClrLst/>
+    <dgm:txFillClrLst/>
+    <dgm:txEffectClrLst/>
+  </dgm:styleLbl>
+  <dgm:styleLbl name="node3">
+    <dgm:fillClrLst meth="repeat">
+      <a:schemeClr val="accent1"/>
+    </dgm:fillClrLst>
+    <dgm:linClrLst meth="repeat">
+      <a:schemeClr val="lt1"/>
+    </dgm:linClrLst>
+    <dgm:effectClrLst/>
+    <dgm:txLinClrLst/>
+    <dgm:txFillClrLst/>
+    <dgm:txEffectClrLst/>
+  </dgm:styleLbl>
+  <dgm:styleLbl name="node4">
+    <dgm:fillClrLst meth="repeat">
+      <a:schemeClr val="accent1"/>
+    </dgm:fillClrLst>
+    <dgm:linClrLst meth="repeat">
+      <a:schemeClr val="lt1"/>
+    </dgm:linClrLst>
+    <dgm:effectClrLst/>
+    <dgm:txLinClrLst/>
+    <dgm:txFillClrLst/>
+    <dgm:txEffectClrLst/>
+  </dgm:styleLbl>
+  <dgm:styleLbl name="fgImgPlace1">
+    <dgm:fillClrLst meth="repeat">
+      <a:schemeClr val="accent1">
+        <a:tint val="50000"/>
+      </a:schemeClr>
+    </dgm:fillClrLst>
+    <dgm:linClrLst meth="repeat">
+      <a:schemeClr val="lt1"/>
+    </dgm:linClrLst>
+    <dgm:effectClrLst/>
+    <dgm:txLinClrLst/>
+    <dgm:txFillClrLst meth="repeat">
+      <a:schemeClr val="lt1"/>
+    </dgm:txFillClrLst>
+    <dgm:txEffectClrLst/>
+  </dgm:styleLbl>
+  <dgm:styleLbl name="alignImgPlace1">
+    <dgm:fillClrLst meth="repeat">
+      <a:schemeClr val="accent1">
+        <a:tint val="50000"/>
+      </a:schemeClr>
+    </dgm:fillClrLst>
+    <dgm:linClrLst meth="repeat">
+      <a:schemeClr val="lt1"/>
+    </dgm:linClrLst>
+    <dgm:effectClrLst/>
+    <dgm:txLinClrLst/>
+    <dgm:txFillClrLst meth="repeat">
+      <a:schemeClr val="lt1"/>
+    </dgm:txFillClrLst>
+    <dgm:txEffectClrLst/>
+  </dgm:styleLbl>
+  <dgm:styleLbl name="bgImgPlace1">
+    <dgm:fillClrLst meth="repeat">
+      <a:schemeClr val="accent1">
+        <a:tint val="50000"/>
+      </a:schemeClr>
+    </dgm:fillClrLst>
+    <dgm:linClrLst meth="repeat">
+      <a:schemeClr val="lt1"/>
+    </dgm:linClrLst>
+    <dgm:effectClrLst/>
+    <dgm:txLinClrLst/>
+    <dgm:txFillClrLst meth="repeat">
+      <a:schemeClr val="lt1"/>
+    </dgm:txFillClrLst>
+    <dgm:txEffectClrLst/>
+  </dgm:styleLbl>
+  <dgm:styleLbl name="sibTrans2D1">
+    <dgm:fillClrLst meth="repeat">
+      <a:schemeClr val="accent1">
+        <a:tint val="60000"/>
+      </a:schemeClr>
+    </dgm:fillClrLst>
+    <dgm:linClrLst meth="repeat">
+      <a:schemeClr val="accent1">
+        <a:tint val="60000"/>
+      </a:schemeClr>
+    </dgm:linClrLst>
+    <dgm:effectClrLst/>
+    <dgm:txLinClrLst/>
+    <dgm:txFillClrLst/>
+    <dgm:txEffectClrLst/>
+  </dgm:styleLbl>
+  <dgm:styleLbl name="fgSibTrans2D1">
+    <dgm:fillClrLst meth="repeat">
+      <a:schemeClr val="accent1">
+        <a:tint val="60000"/>
+      </a:schemeClr>
+    </dgm:fillClrLst>
+    <dgm:linClrLst meth="repeat">
+      <a:schemeClr val="accent1">
+        <a:tint val="60000"/>
+      </a:schemeClr>
+    </dgm:linClrLst>
+    <dgm:effectClrLst/>
+    <dgm:txLinClrLst/>
+    <dgm:txFillClrLst/>
+    <dgm:txEffectClrLst/>
+  </dgm:styleLbl>
+  <dgm:styleLbl name="bgSibTrans2D1">
+    <dgm:fillClrLst meth="repeat">
+      <a:schemeClr val="accent1">
+        <a:tint val="60000"/>
+      </a:schemeClr>
+    </dgm:fillClrLst>
+    <dgm:linClrLst meth="repeat">
+      <a:schemeClr val="accent1">
+        <a:tint val="60000"/>
+      </a:schemeClr>
+    </dgm:linClrLst>
+    <dgm:effectClrLst/>
+    <dgm:txLinClrLst/>
+    <dgm:txFillClrLst/>
+    <dgm:txEffectClrLst/>
+  </dgm:styleLbl>
+  <dgm:styleLbl name="sibTrans1D1">
+    <dgm:fillClrLst meth="repeat">
+      <a:schemeClr val="accent1"/>
+    </dgm:fillClrLst>
+    <dgm:linClrLst meth="repeat">
+      <a:schemeClr val="accent1"/>
+    </dgm:linClrLst>
+    <dgm:effectClrLst/>
+    <dgm:txLinClrLst/>
+    <dgm:txFillClrLst meth="repeat">
+      <a:schemeClr val="tx1"/>
+    </dgm:txFillClrLst>
+    <dgm:txEffectClrLst/>
+  </dgm:styleLbl>
+  <dgm:styleLbl name="callout">
+    <dgm:fillClrLst meth="repeat">
+      <a:schemeClr val="accent1"/>
+    </dgm:fillClrLst>
+    <dgm:linClrLst meth="repeat">
+      <a:schemeClr val="accent1">
+        <a:tint val="50000"/>
+      </a:schemeClr>
+    </dgm:linClrLst>
+    <dgm:effectClrLst/>
+    <dgm:txLinClrLst/>
+    <dgm:txFillClrLst meth="repeat">
+      <a:schemeClr val="tx1"/>
+    </dgm:txFillClrLst>
+    <dgm:txEffectClrLst/>
+  </dgm:styleLbl>
+  <dgm:styleLbl name="asst0">
+    <dgm:fillClrLst meth="repeat">
+      <a:schemeClr val="accent1"/>
+    </dgm:fillClrLst>
+    <dgm:linClrLst meth="repeat">
+      <a:schemeClr val="lt1"/>
+    </dgm:linClrLst>
+    <dgm:effectClrLst/>
+    <dgm:txLinClrLst/>
+    <dgm:txFillClrLst/>
+    <dgm:txEffectClrLst/>
+  </dgm:styleLbl>
+  <dgm:styleLbl name="asst1">
+    <dgm:fillClrLst meth="repeat">
+      <a:schemeClr val="accent1"/>
+    </dgm:fillClrLst>
+    <dgm:linClrLst meth="repeat">
+      <a:schemeClr val="lt1"/>
+    </dgm:linClrLst>
+    <dgm:effectClrLst/>
+    <dgm:txLinClrLst/>
+    <dgm:txFillClrLst/>
+    <dgm:txEffectClrLst/>
+  </dgm:styleLbl>
+  <dgm:styleLbl name="asst2">
+    <dgm:fillClrLst meth="repeat">
+      <a:schemeClr val="accent1"/>
+    </dgm:fillClrLst>
+    <dgm:linClrLst meth="repeat">
+      <a:schemeClr val="lt1"/>
+    </dgm:linClrLst>
+    <dgm:effectClrLst/>
+    <dgm:txLinClrLst/>
+    <dgm:txFillClrLst/>
+    <dgm:txEffectClrLst/>
+  </dgm:styleLbl>
+  <dgm:styleLbl name="asst3">
+    <dgm:fillClrLst meth="repeat">
+      <a:schemeClr val="accent1"/>
+    </dgm:fillClrLst>
+    <dgm:linClrLst meth="repeat">
+      <a:schemeClr val="lt1"/>
+    </dgm:linClrLst>
+    <dgm:effectClrLst/>
+    <dgm:txLinClrLst/>
+    <dgm:txFillClrLst/>
+    <dgm:txEffectClrLst/>
+  </dgm:styleLbl>
+  <dgm:styleLbl name="asst4">
+    <dgm:fillClrLst meth="repeat">
+      <a:schemeClr val="accent1"/>
+    </dgm:fillClrLst>
+    <dgm:linClrLst meth="repeat">
+      <a:schemeClr val="lt1"/>
+    </dgm:linClrLst>
+    <dgm:effectClrLst/>
+    <dgm:txLinClrLst/>
+    <dgm:txFillClrLst/>
+    <dgm:txEffectClrLst/>
+  </dgm:styleLbl>
+  <dgm:styleLbl name="parChTrans2D1">
+    <dgm:fillClrLst meth="repeat">
+      <a:schemeClr val="accent1">
+        <a:tint val="60000"/>
+      </a:schemeClr>
+    </dgm:fillClrLst>
+    <dgm:linClrLst meth="repeat">
+      <a:schemeClr val="accent1">
+        <a:tint val="60000"/>
+      </a:schemeClr>
+    </dgm:linClrLst>
+    <dgm:effectClrLst/>
+    <dgm:txLinClrLst/>
+    <dgm:txFillClrLst meth="repeat">
+      <a:schemeClr val="lt1"/>
+    </dgm:txFillClrLst>
+    <dgm:txEffectClrLst/>
+  </dgm:styleLbl>
+  <dgm:styleLbl name="parChTrans2D2">
+    <dgm:fillClrLst meth="repeat">
+      <a:schemeClr val="accent1"/>
+    </dgm:fillClrLst>
+    <dgm:linClrLst meth="repeat">
+      <a:schemeClr val="accent1"/>
+    </dgm:linClrLst>
+    <dgm:effectClrLst/>
+    <dgm:txLinClrLst/>
+    <dgm:txFillClrLst meth="repeat">
+      <a:schemeClr val="lt1"/>
+    </dgm:txFillClrLst>
+    <dgm:txEffectClrLst/>
+  </dgm:styleLbl>
+  <dgm:styleLbl name="parChTrans2D3">
+    <dgm:fillClrLst meth="repeat">
+      <a:schemeClr val="accent1"/>
+    </dgm:fillClrLst>
+    <dgm:linClrLst meth="repeat">
+      <a:schemeClr val="accent1"/>
+    </dgm:linClrLst>
+    <dgm:effectClrLst/>
+    <dgm:txLinClrLst/>
+    <dgm:txFillClrLst meth="repeat">
+      <a:schemeClr val="lt1"/>
+    </dgm:txFillClrLst>
+    <dgm:txEffectClrLst/>
+  </dgm:styleLbl>
+  <dgm:styleLbl name="parChTrans2D4">
+    <dgm:fillClrLst meth="repeat">
+      <a:schemeClr val="accent1"/>
+    </dgm:fillClrLst>
+    <dgm:linClrLst meth="repeat">
+      <a:schemeClr val="accent1"/>
+    </dgm:linClrLst>
+    <dgm:effectClrLst/>
+    <dgm:txLinClrLst/>
+    <dgm:txFillClrLst meth="repeat">
+      <a:schemeClr val="lt1"/>
+    </dgm:txFillClrLst>
+    <dgm:txEffectClrLst/>
+  </dgm:styleLbl>
+  <dgm:styleLbl name="parChTrans1D1">
+    <dgm:fillClrLst meth="repeat">
+      <a:schemeClr val="accent1"/>
+    </dgm:fillClrLst>
+    <dgm:linClrLst meth="repeat">
+      <a:schemeClr val="accent1">
+        <a:shade val="60000"/>
+      </a:schemeClr>
+    </dgm:linClrLst>
+    <dgm:effectClrLst/>
+    <dgm:txLinClrLst/>
+    <dgm:txFillClrLst meth="repeat">
+      <a:schemeClr val="tx1"/>
+    </dgm:txFillClrLst>
+    <dgm:txEffectClrLst/>
+  </dgm:styleLbl>
+  <dgm:styleLbl name="parChTrans1D2">
+    <dgm:fillClrLst meth="repeat">
+      <a:schemeClr val="accent1"/>
+    </dgm:fillClrLst>
+    <dgm:linClrLst meth="repeat">
+      <a:schemeClr val="accent1">
+        <a:shade val="60000"/>
+      </a:schemeClr>
+    </dgm:linClrLst>
+    <dgm:effectClrLst/>
+    <dgm:txLinClrLst/>
+    <dgm:txFillClrLst meth="repeat">
+      <a:schemeClr val="tx1"/>
+    </dgm:txFillClrLst>
+    <dgm:txEffectClrLst/>
+  </dgm:styleLbl>
+  <dgm:styleLbl name="parChTrans1D3">
+    <dgm:fillClrLst meth="repeat">
+      <a:schemeClr val="accent1"/>
+    </dgm:fillClrLst>
+    <dgm:linClrLst meth="repeat">
+      <a:schemeClr val="accent1">
+        <a:shade val="80000"/>
+      </a:schemeClr>
+    </dgm:linClrLst>
+    <dgm:effectClrLst/>
+    <dgm:txLinClrLst/>
+    <dgm:txFillClrLst meth="repeat">
+      <a:schemeClr val="tx1"/>
+    </dgm:txFillClrLst>
+    <dgm:txEffectClrLst/>
+  </dgm:styleLbl>
+  <dgm:styleLbl name="parChTrans1D4">
+    <dgm:fillClrLst meth="repeat">
+      <a:schemeClr val="accent1"/>
+    </dgm:fillClrLst>
+    <dgm:linClrLst meth="repeat">
+      <a:schemeClr val="accent1">
+        <a:shade val="80000"/>
+      </a:schemeClr>
+    </dgm:linClrLst>
+    <dgm:effectClrLst/>
+    <dgm:txLinClrLst/>
+    <dgm:txFillClrLst meth="repeat">
+      <a:schemeClr val="tx1"/>
+    </dgm:txFillClrLst>
+    <dgm:txEffectClrLst/>
+  </dgm:styleLbl>
+  <dgm:styleLbl name="fgAcc1">
+    <dgm:fillClrLst meth="repeat">
+      <a:schemeClr val="lt1">
+        <a:alpha val="90000"/>
+      </a:schemeClr>
+    </dgm:fillClrLst>
+    <dgm:linClrLst meth="repeat">
+      <a:schemeClr val="accent1"/>
+    </dgm:linClrLst>
+    <dgm:effectClrLst/>
+    <dgm:txLinClrLst/>
+    <dgm:txFillClrLst meth="repeat">
+      <a:schemeClr val="dk1"/>
+    </dgm:txFillClrLst>
+    <dgm:txEffectClrLst/>
+  </dgm:styleLbl>
+  <dgm:styleLbl name="conFgAcc1">
+    <dgm:fillClrLst meth="repeat">
+      <a:schemeClr val="lt1">
+        <a:alpha val="90000"/>
+      </a:schemeClr>
+    </dgm:fillClrLst>
+    <dgm:linClrLst meth="repeat">
+      <a:schemeClr val="accent1"/>
+    </dgm:linClrLst>
+    <dgm:effectClrLst/>
+    <dgm:txLinClrLst/>
+    <dgm:txFillClrLst meth="repeat">
+      <a:schemeClr val="dk1"/>
+    </dgm:txFillClrLst>
+    <dgm:txEffectClrLst/>
+  </dgm:styleLbl>
+  <dgm:styleLbl name="alignAcc1">
+    <dgm:fillClrLst meth="repeat">
+      <a:schemeClr val="lt1">
+        <a:alpha val="90000"/>
+      </a:schemeClr>
+    </dgm:fillClrLst>
+    <dgm:linClrLst meth="repeat">
+      <a:schemeClr val="accent1"/>
+    </dgm:linClrLst>
+    <dgm:effectClrLst/>
+    <dgm:txLinClrLst/>
+    <dgm:txFillClrLst meth="repeat">
+      <a:schemeClr val="dk1"/>
+    </dgm:txFillClrLst>
+    <dgm:txEffectClrLst/>
+  </dgm:styleLbl>
+  <dgm:styleLbl name="trAlignAcc1">
+    <dgm:fillClrLst meth="repeat">
+      <a:schemeClr val="lt1">
+        <a:alpha val="40000"/>
+      </a:schemeClr>
+    </dgm:fillClrLst>
+    <dgm:linClrLst meth="repeat">
+      <a:schemeClr val="accent1"/>
+    </dgm:linClrLst>
+    <dgm:effectClrLst/>
+    <dgm:txLinClrLst/>
+    <dgm:txFillClrLst meth="repeat">
+      <a:schemeClr val="dk1"/>
+    </dgm:txFillClrLst>
+    <dgm:txEffectClrLst/>
+  </dgm:styleLbl>
+  <dgm:styleLbl name="bgAcc1">
+    <dgm:fillClrLst meth="repeat">
+      <a:schemeClr val="lt1">
+        <a:alpha val="90000"/>
+      </a:schemeClr>
+    </dgm:fillClrLst>
+    <dgm:linClrLst meth="repeat">
+      <a:schemeClr val="accent1"/>
+    </dgm:linClrLst>
+    <dgm:effectClrLst/>
+    <dgm:txLinClrLst/>
+    <dgm:txFillClrLst meth="repeat">
+      <a:schemeClr val="dk1"/>
+    </dgm:txFillClrLst>
+    <dgm:txEffectClrLst/>
+  </dgm:styleLbl>
+  <dgm:styleLbl name="solidFgAcc1">
+    <dgm:fillClrLst meth="repeat">
+      <a:schemeClr val="lt1"/>
+    </dgm:fillClrLst>
+    <dgm:linClrLst meth="repeat">
+      <a:schemeClr val="accent1"/>
+    </dgm:linClrLst>
+    <dgm:effectClrLst/>
+    <dgm:txLinClrLst/>
+    <dgm:txFillClrLst meth="repeat">
+      <a:schemeClr val="dk1"/>
+    </dgm:txFillClrLst>
+    <dgm:txEffectClrLst/>
+  </dgm:styleLbl>
+  <dgm:styleLbl name="solidAlignAcc1">
+    <dgm:fillClrLst meth="repeat">
+      <a:schemeClr val="lt1"/>
+    </dgm:fillClrLst>
+    <dgm:linClrLst meth="repeat">
+      <a:schemeClr val="accent1"/>
+    </dgm:linClrLst>
+    <dgm:effectClrLst/>
+    <dgm:txLinClrLst/>
+    <dgm:txFillClrLst meth="repeat">
+      <a:schemeClr val="dk1"/>
+    </dgm:txFillClrLst>
+    <dgm:txEffectClrLst/>
+  </dgm:styleLbl>
+  <dgm:styleLbl name="solidBgAcc1">
+    <dgm:fillClrLst meth="repeat">
+      <a:schemeClr val="lt1"/>
+    </dgm:fillClrLst>
+    <dgm:linClrLst meth="repeat">
+      <a:schemeClr val="accent1"/>
+    </dgm:linClrLst>
+    <dgm:effectClrLst/>
+    <dgm:txLinClrLst/>
+    <dgm:txFillClrLst meth="repeat">
+      <a:schemeClr val="dk1"/>
+    </dgm:txFillClrLst>
+    <dgm:txEffectClrLst/>
+  </dgm:styleLbl>
+  <dgm:styleLbl name="fgAccFollowNode1">
+    <dgm:fillClrLst meth="repeat">
+      <a:schemeClr val="accent1">
+        <a:alpha val="90000"/>
+        <a:tint val="40000"/>
+      </a:schemeClr>
+    </dgm:fillClrLst>
+    <dgm:linClrLst meth="repeat">
+      <a:schemeClr val="accent1">
+        <a:alpha val="90000"/>
+        <a:tint val="40000"/>
+      </a:schemeClr>
+    </dgm:linClrLst>
+    <dgm:effectClrLst/>
+    <dgm:txLinClrLst/>
+    <dgm:txFillClrLst meth="repeat">
+      <a:schemeClr val="dk1"/>
+    </dgm:txFillClrLst>
+    <dgm:txEffectClrLst/>
+  </dgm:styleLbl>
+  <dgm:styleLbl name="alignAccFollowNode1">
+    <dgm:fillClrLst meth="repeat">
+      <a:schemeClr val="accent1">
+        <a:alpha val="90000"/>
+        <a:tint val="40000"/>
+      </a:schemeClr>
+    </dgm:fillClrLst>
+    <dgm:linClrLst meth="repeat">
+      <a:schemeClr val="accent1">
+        <a:alpha val="90000"/>
+        <a:tint val="40000"/>
+      </a:schemeClr>
+    </dgm:linClrLst>
+    <dgm:effectClrLst/>
+    <dgm:txLinClrLst/>
+    <dgm:txFillClrLst meth="repeat">
+      <a:schemeClr val="dk1"/>
+    </dgm:txFillClrLst>
+    <dgm:txEffectClrLst/>
+  </dgm:styleLbl>
+  <dgm:styleLbl name="bgAccFollowNode1">
+    <dgm:fillClrLst meth="repeat">
+      <a:schemeClr val="accent1">
+        <a:alpha val="90000"/>
+        <a:tint val="40000"/>
+      </a:schemeClr>
+    </dgm:fillClrLst>
+    <dgm:linClrLst meth="repeat">
+      <a:schemeClr val="accent1">
+        <a:alpha val="90000"/>
+        <a:tint val="40000"/>
+      </a:schemeClr>
+    </dgm:linClrLst>
+    <dgm:effectClrLst/>
+    <dgm:txLinClrLst/>
+    <dgm:txFillClrLst meth="repeat">
+      <a:schemeClr val="dk1"/>
+    </dgm:txFillClrLst>
+    <dgm:txEffectClrLst/>
+  </dgm:styleLbl>
+  <dgm:styleLbl name="fgAcc0">
+    <dgm:fillClrLst meth="repeat">
+      <a:schemeClr val="lt1">
+        <a:alpha val="90000"/>
+      </a:schemeClr>
+    </dgm:fillClrLst>
+    <dgm:linClrLst meth="repeat">
+      <a:schemeClr val="accent1"/>
+    </dgm:linClrLst>
+    <dgm:effectClrLst/>
+    <dgm:txLinClrLst/>
+    <dgm:txFillClrLst meth="repeat">
+      <a:schemeClr val="dk1"/>
+    </dgm:txFillClrLst>
+    <dgm:txEffectClrLst/>
+  </dgm:styleLbl>
+  <dgm:styleLbl name="fgAcc2">
+    <dgm:fillClrLst meth="repeat">
+      <a:schemeClr val="lt1">
+        <a:alpha val="90000"/>
+      </a:schemeClr>
+    </dgm:fillClrLst>
+    <dgm:linClrLst meth="repeat">
+      <a:schemeClr val="accent1"/>
+    </dgm:linClrLst>
+    <dgm:effectClrLst/>
+    <dgm:txLinClrLst/>
+    <dgm:txFillClrLst meth="repeat">
+      <a:schemeClr val="dk1"/>
+    </dgm:txFillClrLst>
+    <dgm:txEffectClrLst/>
+  </dgm:styleLbl>
+  <dgm:styleLbl name="fgAcc3">
+    <dgm:fillClrLst meth="repeat">
+      <a:schemeClr val="lt1">
+        <a:alpha val="90000"/>
+      </a:schemeClr>
+    </dgm:fillClrLst>
+    <dgm:linClrLst meth="repeat">
+      <a:schemeClr val="accent1"/>
+    </dgm:linClrLst>
+    <dgm:effectClrLst/>
+    <dgm:txLinClrLst/>
+    <dgm:txFillClrLst meth="repeat">
+      <a:schemeClr val="dk1"/>
+    </dgm:txFillClrLst>
+    <dgm:txEffectClrLst/>
+  </dgm:styleLbl>
+  <dgm:styleLbl name="fgAcc4">
+    <dgm:fillClrLst meth="repeat">
+      <a:schemeClr val="lt1">
+        <a:alpha val="90000"/>
+      </a:schemeClr>
+    </dgm:fillClrLst>
+    <dgm:linClrLst meth="repeat">
+      <a:schemeClr val="accent1"/>
+    </dgm:linClrLst>
+    <dgm:effectClrLst/>
+    <dgm:txLinClrLst/>
+    <dgm:txFillClrLst meth="repeat">
+      <a:schemeClr val="dk1"/>
+    </dgm:txFillClrLst>
+    <dgm:txEffectClrLst/>
+  </dgm:styleLbl>
+  <dgm:styleLbl name="bgShp">
+    <dgm:fillClrLst meth="repeat">
+      <a:schemeClr val="accent1">
+        <a:tint val="40000"/>
+      </a:schemeClr>
+    </dgm:fillClrLst>
+    <dgm:linClrLst meth="repeat">
+      <a:schemeClr val="accent1"/>
+    </dgm:linClrLst>
+    <dgm:effectClrLst/>
+    <dgm:txLinClrLst/>
+    <dgm:txFillClrLst meth="repeat">
+      <a:schemeClr val="dk1"/>
+    </dgm:txFillClrLst>
+    <dgm:txEffectClrLst/>
+  </dgm:styleLbl>
+  <dgm:styleLbl name="dkBgShp">
+    <dgm:fillClrLst meth="repeat">
+      <a:schemeClr val="accent1">
+        <a:shade val="80000"/>
+      </a:schemeClr>
+    </dgm:fillClrLst>
+    <dgm:linClrLst meth="repeat">
+      <a:schemeClr val="accent1"/>
+    </dgm:linClrLst>
+    <dgm:effectClrLst/>
+    <dgm:txLinClrLst/>
+    <dgm:txFillClrLst meth="repeat">
+      <a:schemeClr val="lt1"/>
+    </dgm:txFillClrLst>
+    <dgm:txEffectClrLst/>
+  </dgm:styleLbl>
+  <dgm:styleLbl name="trBgShp">
+    <dgm:fillClrLst meth="repeat">
+      <a:schemeClr val="accent1">
+        <a:tint val="50000"/>
+        <a:alpha val="40000"/>
+      </a:schemeClr>
+    </dgm:fillClrLst>
+    <dgm:linClrLst meth="repeat">
+      <a:schemeClr val="accent1"/>
+    </dgm:linClrLst>
+    <dgm:effectClrLst/>
+    <dgm:txLinClrLst/>
+    <dgm:txFillClrLst meth="repeat">
+      <a:schemeClr val="lt1"/>
+    </dgm:txFillClrLst>
+    <dgm:txEffectClrLst/>
+  </dgm:styleLbl>
+  <dgm:styleLbl name="fgShp">
+    <dgm:fillClrLst meth="repeat">
+      <a:schemeClr val="accent1">
+        <a:tint val="60000"/>
+      </a:schemeClr>
+    </dgm:fillClrLst>
+    <dgm:linClrLst meth="repeat">
+      <a:schemeClr val="lt1"/>
+    </dgm:linClrLst>
+    <dgm:effectClrLst/>
+    <dgm:txLinClrLst/>
+    <dgm:txFillClrLst meth="repeat">
+      <a:schemeClr val="dk1"/>
+    </dgm:txFillClrLst>
+    <dgm:txEffectClrLst/>
+  </dgm:styleLbl>
+  <dgm:styleLbl name="revTx">
+    <dgm:fillClrLst meth="repeat">
+      <a:schemeClr val="lt1">
+        <a:alpha val="0"/>
+      </a:schemeClr>
+    </dgm:fillClrLst>
+    <dgm:linClrLst meth="repeat">
+      <a:schemeClr val="dk1">
+        <a:alpha val="0"/>
+      </a:schemeClr>
+    </dgm:linClrLst>
+    <dgm:effectClrLst/>
+    <dgm:txLinClrLst/>
+    <dgm:txFillClrLst meth="repeat">
+      <a:schemeClr val="tx1"/>
+    </dgm:txFillClrLst>
+    <dgm:txEffectClrLst/>
+  </dgm:styleLbl>
+</dgm:colorsDef>
+</file>
+
+<file path=ppt/diagrams/data1.xml><?xml version="1.0" encoding="utf-8"?>
+<dgm:dataModel xmlns:dgm="http://schemas.openxmlformats.org/drawingml/2006/diagram" xmlns:a="http://schemas.openxmlformats.org/drawingml/2006/main">
+  <dgm:ptLst>
+    <dgm:pt modelId="{3E9BB59C-3442-AB47-9516-D05C2740C812}" type="doc">
+      <dgm:prSet loTypeId="urn:microsoft.com/office/officeart/2005/8/layout/process1" loCatId="" qsTypeId="urn:microsoft.com/office/officeart/2005/8/quickstyle/simple4" qsCatId="simple" csTypeId="urn:microsoft.com/office/officeart/2005/8/colors/accent1_2" csCatId="accent1" phldr="1"/>
+      <dgm:spPr/>
+    </dgm:pt>
+    <dgm:pt modelId="{7FD01E35-3593-C74D-BE1E-E2D79F07B665}">
+      <dgm:prSet phldrT="[Text]"/>
+      <dgm:spPr/>
+      <dgm:t>
+        <a:bodyPr/>
+        <a:lstStyle/>
+        <a:p>
+          <a:r>
+            <a:rPr lang="en-US" dirty="0" smtClean="0"/>
+            <a:t>shapes[5]</a:t>
+          </a:r>
+          <a:endParaRPr lang="en-US" dirty="0"/>
+        </a:p>
+      </dgm:t>
+    </dgm:pt>
+    <dgm:pt modelId="{6EB3FD27-4969-0344-A7F8-DF763F0952DD}" type="parTrans" cxnId="{BE58425E-C51E-EF4E-B583-4121D8487EAA}">
+      <dgm:prSet/>
+      <dgm:spPr/>
+      <dgm:t>
+        <a:bodyPr/>
+        <a:lstStyle/>
+        <a:p>
+          <a:endParaRPr lang="en-US"/>
+        </a:p>
+      </dgm:t>
+    </dgm:pt>
+    <dgm:pt modelId="{BCEB9037-8135-8C4C-8B2E-4F3B2854A41B}" type="sibTrans" cxnId="{BE58425E-C51E-EF4E-B583-4121D8487EAA}">
+      <dgm:prSet/>
+      <dgm:spPr/>
+      <dgm:t>
+        <a:bodyPr/>
+        <a:lstStyle/>
+        <a:p>
+          <a:endParaRPr lang="en-US"/>
+        </a:p>
+      </dgm:t>
+    </dgm:pt>
+    <dgm:pt modelId="{6672BA30-8935-A046-8594-76596A1105FD}">
+      <dgm:prSet phldrT="[Text]"/>
+      <dgm:spPr/>
+      <dgm:t>
+        <a:bodyPr/>
+        <a:lstStyle/>
+        <a:p>
+          <a:r>
+            <a:rPr lang="en-US" dirty="0" smtClean="0"/>
+            <a:t> </a:t>
+          </a:r>
+          <a:endParaRPr lang="en-US" dirty="0"/>
+        </a:p>
+      </dgm:t>
+    </dgm:pt>
+    <dgm:pt modelId="{F81283A4-AB68-384C-9231-AC080E61C25E}" type="parTrans" cxnId="{C8E8C13E-4DC9-8E48-8322-2974F6F32975}">
+      <dgm:prSet/>
+      <dgm:spPr/>
+      <dgm:t>
+        <a:bodyPr/>
+        <a:lstStyle/>
+        <a:p>
+          <a:endParaRPr lang="en-US"/>
+        </a:p>
+      </dgm:t>
+    </dgm:pt>
+    <dgm:pt modelId="{E8204F49-CD84-5D4D-B192-4438A152B1DC}" type="sibTrans" cxnId="{C8E8C13E-4DC9-8E48-8322-2974F6F32975}">
+      <dgm:prSet/>
+      <dgm:spPr/>
+      <dgm:t>
+        <a:bodyPr/>
+        <a:lstStyle/>
+        <a:p>
+          <a:endParaRPr lang="en-US"/>
+        </a:p>
+      </dgm:t>
+    </dgm:pt>
+    <dgm:pt modelId="{B185EE18-05E4-C240-B77F-AE95E9EB9C5F}">
+      <dgm:prSet phldrT="[Text]"/>
+      <dgm:spPr/>
+      <dgm:t>
+        <a:bodyPr/>
+        <a:lstStyle/>
+        <a:p>
+          <a:r>
+            <a:rPr lang="en-US" dirty="0" smtClean="0"/>
+            <a:t> Smart Art</a:t>
+          </a:r>
+          <a:endParaRPr lang="en-US" dirty="0"/>
+        </a:p>
+      </dgm:t>
+    </dgm:pt>
+    <dgm:pt modelId="{F01162CA-006C-9D4C-9CC6-2811640B7B89}" type="parTrans" cxnId="{A2EA90B4-3904-3349-B3FF-645BD8927CF1}">
+      <dgm:prSet/>
+      <dgm:spPr/>
+      <dgm:t>
+        <a:bodyPr/>
+        <a:lstStyle/>
+        <a:p>
+          <a:endParaRPr lang="en-US"/>
+        </a:p>
+      </dgm:t>
+    </dgm:pt>
+    <dgm:pt modelId="{8979796F-091D-9742-B614-D5916ABC1D06}" type="sibTrans" cxnId="{A2EA90B4-3904-3349-B3FF-645BD8927CF1}">
+      <dgm:prSet/>
+      <dgm:spPr/>
+      <dgm:t>
+        <a:bodyPr/>
+        <a:lstStyle/>
+        <a:p>
+          <a:endParaRPr lang="en-US"/>
+        </a:p>
+      </dgm:t>
+    </dgm:pt>
+    <dgm:pt modelId="{884301EF-0A41-2F4C-82F5-8B9E2FF113BC}" type="pres">
+      <dgm:prSet presAssocID="{3E9BB59C-3442-AB47-9516-D05C2740C812}" presName="Name0" presStyleCnt="0">
+        <dgm:presLayoutVars>
+          <dgm:dir/>
+          <dgm:resizeHandles val="exact"/>
+        </dgm:presLayoutVars>
+      </dgm:prSet>
+      <dgm:spPr/>
+    </dgm:pt>
+    <dgm:pt modelId="{5A183679-F237-8E4A-BA44-AAD532C514F1}" type="pres">
+      <dgm:prSet presAssocID="{7FD01E35-3593-C74D-BE1E-E2D79F07B665}" presName="node" presStyleLbl="node1" presStyleIdx="0" presStyleCnt="3">
+        <dgm:presLayoutVars>
+          <dgm:bulletEnabled val="1"/>
+        </dgm:presLayoutVars>
+      </dgm:prSet>
+      <dgm:spPr/>
+      <dgm:t>
+        <a:bodyPr/>
+        <a:lstStyle/>
+        <a:p>
+          <a:endParaRPr lang="en-US"/>
+        </a:p>
+      </dgm:t>
+    </dgm:pt>
+    <dgm:pt modelId="{76DBFE1B-4144-9848-BF42-89AD15BEB370}" type="pres">
+      <dgm:prSet presAssocID="{BCEB9037-8135-8C4C-8B2E-4F3B2854A41B}" presName="sibTrans" presStyleLbl="sibTrans2D1" presStyleIdx="0" presStyleCnt="2"/>
+      <dgm:spPr/>
+    </dgm:pt>
+    <dgm:pt modelId="{9796588B-6583-2B41-93DC-0459614D954B}" type="pres">
+      <dgm:prSet presAssocID="{BCEB9037-8135-8C4C-8B2E-4F3B2854A41B}" presName="connectorText" presStyleLbl="sibTrans2D1" presStyleIdx="0" presStyleCnt="2"/>
+      <dgm:spPr/>
+    </dgm:pt>
+    <dgm:pt modelId="{A998EA2A-9166-EA4D-AD00-C84E18DA4D0C}" type="pres">
+      <dgm:prSet presAssocID="{6672BA30-8935-A046-8594-76596A1105FD}" presName="node" presStyleLbl="node1" presStyleIdx="1" presStyleCnt="3">
+        <dgm:presLayoutVars>
+          <dgm:bulletEnabled val="1"/>
+        </dgm:presLayoutVars>
+      </dgm:prSet>
+      <dgm:spPr/>
+      <dgm:t>
+        <a:bodyPr/>
+        <a:lstStyle/>
+        <a:p>
+          <a:endParaRPr lang="en-US"/>
+        </a:p>
+      </dgm:t>
+    </dgm:pt>
+    <dgm:pt modelId="{D7E6BFD9-07A3-C64B-9399-EE30EC59A042}" type="pres">
+      <dgm:prSet presAssocID="{E8204F49-CD84-5D4D-B192-4438A152B1DC}" presName="sibTrans" presStyleLbl="sibTrans2D1" presStyleIdx="1" presStyleCnt="2"/>
+      <dgm:spPr/>
+    </dgm:pt>
+    <dgm:pt modelId="{ADD493EA-4D67-0041-BAF0-4E5FE09FCEE8}" type="pres">
+      <dgm:prSet presAssocID="{E8204F49-CD84-5D4D-B192-4438A152B1DC}" presName="connectorText" presStyleLbl="sibTrans2D1" presStyleIdx="1" presStyleCnt="2"/>
+      <dgm:spPr/>
+    </dgm:pt>
+    <dgm:pt modelId="{A7CEAFEB-AFA1-0349-AD09-A062A478B8A0}" type="pres">
+      <dgm:prSet presAssocID="{B185EE18-05E4-C240-B77F-AE95E9EB9C5F}" presName="node" presStyleLbl="node1" presStyleIdx="2" presStyleCnt="3">
+        <dgm:presLayoutVars>
+          <dgm:bulletEnabled val="1"/>
+        </dgm:presLayoutVars>
+      </dgm:prSet>
+      <dgm:spPr/>
+    </dgm:pt>
+  </dgm:ptLst>
+  <dgm:cxnLst>
+    <dgm:cxn modelId="{41ED687E-D039-1A40-87D5-D21A6730C7E3}" type="presOf" srcId="{E8204F49-CD84-5D4D-B192-4438A152B1DC}" destId="{ADD493EA-4D67-0041-BAF0-4E5FE09FCEE8}" srcOrd="1" destOrd="0" presId="urn:microsoft.com/office/officeart/2005/8/layout/process1"/>
+    <dgm:cxn modelId="{7F51998E-4013-8F46-9B19-09BEE5B01182}" type="presOf" srcId="{BCEB9037-8135-8C4C-8B2E-4F3B2854A41B}" destId="{76DBFE1B-4144-9848-BF42-89AD15BEB370}" srcOrd="0" destOrd="0" presId="urn:microsoft.com/office/officeart/2005/8/layout/process1"/>
+    <dgm:cxn modelId="{A2EA90B4-3904-3349-B3FF-645BD8927CF1}" srcId="{3E9BB59C-3442-AB47-9516-D05C2740C812}" destId="{B185EE18-05E4-C240-B77F-AE95E9EB9C5F}" srcOrd="2" destOrd="0" parTransId="{F01162CA-006C-9D4C-9CC6-2811640B7B89}" sibTransId="{8979796F-091D-9742-B614-D5916ABC1D06}"/>
+    <dgm:cxn modelId="{1B17ECB2-6AF4-E443-A1A7-5203FAA807D5}" type="presOf" srcId="{7FD01E35-3593-C74D-BE1E-E2D79F07B665}" destId="{5A183679-F237-8E4A-BA44-AAD532C514F1}" srcOrd="0" destOrd="0" presId="urn:microsoft.com/office/officeart/2005/8/layout/process1"/>
+    <dgm:cxn modelId="{15483B35-BC6E-8C47-8503-F73D9608BEA4}" type="presOf" srcId="{6672BA30-8935-A046-8594-76596A1105FD}" destId="{A998EA2A-9166-EA4D-AD00-C84E18DA4D0C}" srcOrd="0" destOrd="0" presId="urn:microsoft.com/office/officeart/2005/8/layout/process1"/>
+    <dgm:cxn modelId="{25EA6AF1-3D8C-C649-B2B8-3F9E0938842B}" type="presOf" srcId="{3E9BB59C-3442-AB47-9516-D05C2740C812}" destId="{884301EF-0A41-2F4C-82F5-8B9E2FF113BC}" srcOrd="0" destOrd="0" presId="urn:microsoft.com/office/officeart/2005/8/layout/process1"/>
+    <dgm:cxn modelId="{A23C85E5-4965-6144-B5D1-A3D63197114B}" type="presOf" srcId="{B185EE18-05E4-C240-B77F-AE95E9EB9C5F}" destId="{A7CEAFEB-AFA1-0349-AD09-A062A478B8A0}" srcOrd="0" destOrd="0" presId="urn:microsoft.com/office/officeart/2005/8/layout/process1"/>
+    <dgm:cxn modelId="{59B2CEE5-BFB0-D548-AB5A-AAEDCE698B8E}" type="presOf" srcId="{E8204F49-CD84-5D4D-B192-4438A152B1DC}" destId="{D7E6BFD9-07A3-C64B-9399-EE30EC59A042}" srcOrd="0" destOrd="0" presId="urn:microsoft.com/office/officeart/2005/8/layout/process1"/>
+    <dgm:cxn modelId="{C8E8C13E-4DC9-8E48-8322-2974F6F32975}" srcId="{3E9BB59C-3442-AB47-9516-D05C2740C812}" destId="{6672BA30-8935-A046-8594-76596A1105FD}" srcOrd="1" destOrd="0" parTransId="{F81283A4-AB68-384C-9231-AC080E61C25E}" sibTransId="{E8204F49-CD84-5D4D-B192-4438A152B1DC}"/>
+    <dgm:cxn modelId="{B69E4433-BC95-9D49-BD75-99B96BC91980}" type="presOf" srcId="{BCEB9037-8135-8C4C-8B2E-4F3B2854A41B}" destId="{9796588B-6583-2B41-93DC-0459614D954B}" srcOrd="1" destOrd="0" presId="urn:microsoft.com/office/officeart/2005/8/layout/process1"/>
+    <dgm:cxn modelId="{BE58425E-C51E-EF4E-B583-4121D8487EAA}" srcId="{3E9BB59C-3442-AB47-9516-D05C2740C812}" destId="{7FD01E35-3593-C74D-BE1E-E2D79F07B665}" srcOrd="0" destOrd="0" parTransId="{6EB3FD27-4969-0344-A7F8-DF763F0952DD}" sibTransId="{BCEB9037-8135-8C4C-8B2E-4F3B2854A41B}"/>
+    <dgm:cxn modelId="{55E6B479-7D0A-A649-9E9A-E79EDCA0F21D}" type="presParOf" srcId="{884301EF-0A41-2F4C-82F5-8B9E2FF113BC}" destId="{5A183679-F237-8E4A-BA44-AAD532C514F1}" srcOrd="0" destOrd="0" presId="urn:microsoft.com/office/officeart/2005/8/layout/process1"/>
+    <dgm:cxn modelId="{0F793D96-8224-5C40-83BF-0BA4688B8D4B}" type="presParOf" srcId="{884301EF-0A41-2F4C-82F5-8B9E2FF113BC}" destId="{76DBFE1B-4144-9848-BF42-89AD15BEB370}" srcOrd="1" destOrd="0" presId="urn:microsoft.com/office/officeart/2005/8/layout/process1"/>
+    <dgm:cxn modelId="{30121910-4BC3-914C-BDBF-54CC313B8553}" type="presParOf" srcId="{76DBFE1B-4144-9848-BF42-89AD15BEB370}" destId="{9796588B-6583-2B41-93DC-0459614D954B}" srcOrd="0" destOrd="0" presId="urn:microsoft.com/office/officeart/2005/8/layout/process1"/>
+    <dgm:cxn modelId="{E3570E59-C184-284C-8EDA-F7D0AB5C42CE}" type="presParOf" srcId="{884301EF-0A41-2F4C-82F5-8B9E2FF113BC}" destId="{A998EA2A-9166-EA4D-AD00-C84E18DA4D0C}" srcOrd="2" destOrd="0" presId="urn:microsoft.com/office/officeart/2005/8/layout/process1"/>
+    <dgm:cxn modelId="{DCAA27EF-6A49-9149-AFCF-7BB6EF302E40}" type="presParOf" srcId="{884301EF-0A41-2F4C-82F5-8B9E2FF113BC}" destId="{D7E6BFD9-07A3-C64B-9399-EE30EC59A042}" srcOrd="3" destOrd="0" presId="urn:microsoft.com/office/officeart/2005/8/layout/process1"/>
+    <dgm:cxn modelId="{E4230820-3AC6-7442-82CB-65B435CB316A}" type="presParOf" srcId="{D7E6BFD9-07A3-C64B-9399-EE30EC59A042}" destId="{ADD493EA-4D67-0041-BAF0-4E5FE09FCEE8}" srcOrd="0" destOrd="0" presId="urn:microsoft.com/office/officeart/2005/8/layout/process1"/>
+    <dgm:cxn modelId="{6D9C0B2F-5707-DB41-8988-C2770434E226}" type="presParOf" srcId="{884301EF-0A41-2F4C-82F5-8B9E2FF113BC}" destId="{A7CEAFEB-AFA1-0349-AD09-A062A478B8A0}" srcOrd="4" destOrd="0" presId="urn:microsoft.com/office/officeart/2005/8/layout/process1"/>
+  </dgm:cxnLst>
+  <dgm:bg/>
+  <dgm:whole/>
+  <dgm:extLst>
+    <a:ext uri="http://schemas.microsoft.com/office/drawing/2008/diagram">
+      <dsp:dataModelExt xmlns:dsp="http://schemas.microsoft.com/office/drawing/2008/diagram" relId="rId8" minVer="http://schemas.openxmlformats.org/drawingml/2006/diagram"/>
+    </a:ext>
+  </dgm:extLst>
+</dgm:dataModel>
+</file>
+
+<file path=ppt/diagrams/drawing1.xml><?xml version="1.0" encoding="utf-8"?>
+<dsp:drawing xmlns:dgm="http://schemas.openxmlformats.org/drawingml/2006/diagram" xmlns:dsp="http://schemas.microsoft.com/office/drawing/2008/diagram" xmlns:a="http://schemas.openxmlformats.org/drawingml/2006/main">
+  <dsp:spTree>
+    <dsp:nvGrpSpPr>
+      <dsp:cNvPr id="0" name=""/>
+      <dsp:cNvGrpSpPr/>
+    </dsp:nvGrpSpPr>
+    <dsp:grpSpPr/>
+    <dsp:sp modelId="{5A183679-F237-8E4A-BA44-AAD532C514F1}">
+      <dsp:nvSpPr>
+        <dsp:cNvPr id="0" name=""/>
+        <dsp:cNvSpPr/>
+      </dsp:nvSpPr>
+      <dsp:spPr>
+        <a:xfrm>
+          <a:off x="3354" y="851360"/>
+          <a:ext cx="1002556" cy="601534"/>
+        </a:xfrm>
+        <a:prstGeom prst="roundRect">
+          <a:avLst>
+            <a:gd name="adj" fmla="val 10000"/>
+          </a:avLst>
+        </a:prstGeom>
+        <a:gradFill rotWithShape="0">
+          <a:gsLst>
+            <a:gs pos="0">
+              <a:schemeClr val="accent1">
+                <a:hueOff val="0"/>
+                <a:satOff val="0"/>
+                <a:lumOff val="0"/>
+                <a:alphaOff val="0"/>
+                <a:shade val="51000"/>
+                <a:satMod val="130000"/>
+              </a:schemeClr>
+            </a:gs>
+            <a:gs pos="80000">
+              <a:schemeClr val="accent1">
+                <a:hueOff val="0"/>
+                <a:satOff val="0"/>
+                <a:lumOff val="0"/>
+                <a:alphaOff val="0"/>
+                <a:shade val="93000"/>
+                <a:satMod val="130000"/>
+              </a:schemeClr>
+            </a:gs>
+            <a:gs pos="100000">
+              <a:schemeClr val="accent1">
+                <a:hueOff val="0"/>
+                <a:satOff val="0"/>
+                <a:lumOff val="0"/>
+                <a:alphaOff val="0"/>
+                <a:shade val="94000"/>
+                <a:satMod val="135000"/>
+              </a:schemeClr>
+            </a:gs>
+          </a:gsLst>
+          <a:lin ang="16200000" scaled="0"/>
+        </a:gradFill>
+        <a:ln>
+          <a:noFill/>
+        </a:ln>
+        <a:effectLst>
+          <a:outerShdw blurRad="40000" dist="23000" dir="5400000" rotWithShape="0">
+            <a:srgbClr val="000000">
+              <a:alpha val="35000"/>
+            </a:srgbClr>
+          </a:outerShdw>
+        </a:effectLst>
+      </dsp:spPr>
+      <dsp:style>
+        <a:lnRef idx="0">
+          <a:scrgbClr r="0" g="0" b="0"/>
+        </a:lnRef>
+        <a:fillRef idx="3">
+          <a:scrgbClr r="0" g="0" b="0"/>
+        </a:fillRef>
+        <a:effectRef idx="2">
+          <a:scrgbClr r="0" g="0" b="0"/>
+        </a:effectRef>
+        <a:fontRef idx="minor">
+          <a:schemeClr val="lt1"/>
+        </a:fontRef>
+      </dsp:style>
+      <dsp:txBody>
+        <a:bodyPr spcFirstLastPara="0" vert="horz" wrap="square" lIns="60960" tIns="60960" rIns="60960" bIns="60960" numCol="1" spcCol="1270" anchor="ctr" anchorCtr="0">
+          <a:noAutofit/>
+        </a:bodyPr>
+        <a:lstStyle/>
+        <a:p>
+          <a:pPr lvl="0" algn="ctr" defTabSz="711200">
+            <a:lnSpc>
+              <a:spcPct val="90000"/>
+            </a:lnSpc>
+            <a:spcBef>
+              <a:spcPct val="0"/>
+            </a:spcBef>
+            <a:spcAft>
+              <a:spcPct val="35000"/>
+            </a:spcAft>
+          </a:pPr>
+          <a:r>
+            <a:rPr lang="en-US" sz="1600" kern="1200" dirty="0" smtClean="0"/>
+            <a:t>shapes[5]</a:t>
+          </a:r>
+          <a:endParaRPr lang="en-US" sz="1600" kern="1200" dirty="0"/>
+        </a:p>
+      </dsp:txBody>
+      <dsp:txXfrm>
+        <a:off x="20972" y="868978"/>
+        <a:ext cx="967320" cy="566298"/>
+      </dsp:txXfrm>
+    </dsp:sp>
+    <dsp:sp modelId="{76DBFE1B-4144-9848-BF42-89AD15BEB370}">
+      <dsp:nvSpPr>
+        <dsp:cNvPr id="0" name=""/>
+        <dsp:cNvSpPr/>
+      </dsp:nvSpPr>
+      <dsp:spPr>
+        <a:xfrm>
+          <a:off x="1106166" y="1027810"/>
+          <a:ext cx="212542" cy="248634"/>
+        </a:xfrm>
+        <a:prstGeom prst="rightArrow">
+          <a:avLst>
+            <a:gd name="adj1" fmla="val 60000"/>
+            <a:gd name="adj2" fmla="val 50000"/>
+          </a:avLst>
+        </a:prstGeom>
+        <a:gradFill rotWithShape="0">
+          <a:gsLst>
+            <a:gs pos="0">
+              <a:schemeClr val="accent1">
+                <a:tint val="60000"/>
+                <a:hueOff val="0"/>
+                <a:satOff val="0"/>
+                <a:lumOff val="0"/>
+                <a:alphaOff val="0"/>
+                <a:shade val="51000"/>
+                <a:satMod val="130000"/>
+              </a:schemeClr>
+            </a:gs>
+            <a:gs pos="80000">
+              <a:schemeClr val="accent1">
+                <a:tint val="60000"/>
+                <a:hueOff val="0"/>
+                <a:satOff val="0"/>
+                <a:lumOff val="0"/>
+                <a:alphaOff val="0"/>
+                <a:shade val="93000"/>
+                <a:satMod val="130000"/>
+              </a:schemeClr>
+            </a:gs>
+            <a:gs pos="100000">
+              <a:schemeClr val="accent1">
+                <a:tint val="60000"/>
+                <a:hueOff val="0"/>
+                <a:satOff val="0"/>
+                <a:lumOff val="0"/>
+                <a:alphaOff val="0"/>
+                <a:shade val="94000"/>
+                <a:satMod val="135000"/>
+              </a:schemeClr>
+            </a:gs>
+          </a:gsLst>
+          <a:lin ang="16200000" scaled="0"/>
+        </a:gradFill>
+        <a:ln>
+          <a:noFill/>
+        </a:ln>
+        <a:effectLst>
+          <a:outerShdw blurRad="40000" dist="23000" dir="5400000" rotWithShape="0">
+            <a:srgbClr val="000000">
+              <a:alpha val="35000"/>
+            </a:srgbClr>
+          </a:outerShdw>
+        </a:effectLst>
+      </dsp:spPr>
+      <dsp:style>
+        <a:lnRef idx="0">
+          <a:scrgbClr r="0" g="0" b="0"/>
+        </a:lnRef>
+        <a:fillRef idx="3">
+          <a:scrgbClr r="0" g="0" b="0"/>
+        </a:fillRef>
+        <a:effectRef idx="2">
+          <a:scrgbClr r="0" g="0" b="0"/>
+        </a:effectRef>
+        <a:fontRef idx="minor">
+          <a:schemeClr val="lt1"/>
+        </a:fontRef>
+      </dsp:style>
+      <dsp:txBody>
+        <a:bodyPr spcFirstLastPara="0" vert="horz" wrap="square" lIns="0" tIns="0" rIns="0" bIns="0" numCol="1" spcCol="1270" anchor="ctr" anchorCtr="0">
+          <a:noAutofit/>
+        </a:bodyPr>
+        <a:lstStyle/>
+        <a:p>
+          <a:pPr lvl="0" algn="ctr" defTabSz="444500">
+            <a:lnSpc>
+              <a:spcPct val="90000"/>
+            </a:lnSpc>
+            <a:spcBef>
+              <a:spcPct val="0"/>
+            </a:spcBef>
+            <a:spcAft>
+              <a:spcPct val="35000"/>
+            </a:spcAft>
+          </a:pPr>
+          <a:endParaRPr lang="en-US" sz="1000" kern="1200"/>
+        </a:p>
+      </dsp:txBody>
+      <dsp:txXfrm>
+        <a:off x="1106166" y="1077537"/>
+        <a:ext cx="148779" cy="149180"/>
+      </dsp:txXfrm>
+    </dsp:sp>
+    <dsp:sp modelId="{A998EA2A-9166-EA4D-AD00-C84E18DA4D0C}">
+      <dsp:nvSpPr>
+        <dsp:cNvPr id="0" name=""/>
+        <dsp:cNvSpPr/>
+      </dsp:nvSpPr>
+      <dsp:spPr>
+        <a:xfrm>
+          <a:off x="1406933" y="851360"/>
+          <a:ext cx="1002556" cy="601534"/>
+        </a:xfrm>
+        <a:prstGeom prst="roundRect">
+          <a:avLst>
+            <a:gd name="adj" fmla="val 10000"/>
+          </a:avLst>
+        </a:prstGeom>
+        <a:gradFill rotWithShape="0">
+          <a:gsLst>
+            <a:gs pos="0">
+              <a:schemeClr val="accent1">
+                <a:hueOff val="0"/>
+                <a:satOff val="0"/>
+                <a:lumOff val="0"/>
+                <a:alphaOff val="0"/>
+                <a:shade val="51000"/>
+                <a:satMod val="130000"/>
+              </a:schemeClr>
+            </a:gs>
+            <a:gs pos="80000">
+              <a:schemeClr val="accent1">
+                <a:hueOff val="0"/>
+                <a:satOff val="0"/>
+                <a:lumOff val="0"/>
+                <a:alphaOff val="0"/>
+                <a:shade val="93000"/>
+                <a:satMod val="130000"/>
+              </a:schemeClr>
+            </a:gs>
+            <a:gs pos="100000">
+              <a:schemeClr val="accent1">
+                <a:hueOff val="0"/>
+                <a:satOff val="0"/>
+                <a:lumOff val="0"/>
+                <a:alphaOff val="0"/>
+                <a:shade val="94000"/>
+                <a:satMod val="135000"/>
+              </a:schemeClr>
+            </a:gs>
+          </a:gsLst>
+          <a:lin ang="16200000" scaled="0"/>
+        </a:gradFill>
+        <a:ln>
+          <a:noFill/>
+        </a:ln>
+        <a:effectLst>
+          <a:outerShdw blurRad="40000" dist="23000" dir="5400000" rotWithShape="0">
+            <a:srgbClr val="000000">
+              <a:alpha val="35000"/>
+            </a:srgbClr>
+          </a:outerShdw>
+        </a:effectLst>
+      </dsp:spPr>
+      <dsp:style>
+        <a:lnRef idx="0">
+          <a:scrgbClr r="0" g="0" b="0"/>
+        </a:lnRef>
+        <a:fillRef idx="3">
+          <a:scrgbClr r="0" g="0" b="0"/>
+        </a:fillRef>
+        <a:effectRef idx="2">
+          <a:scrgbClr r="0" g="0" b="0"/>
+        </a:effectRef>
+        <a:fontRef idx="minor">
+          <a:schemeClr val="lt1"/>
+        </a:fontRef>
+      </dsp:style>
+      <dsp:txBody>
+        <a:bodyPr spcFirstLastPara="0" vert="horz" wrap="square" lIns="60960" tIns="60960" rIns="60960" bIns="60960" numCol="1" spcCol="1270" anchor="ctr" anchorCtr="0">
+          <a:noAutofit/>
+        </a:bodyPr>
+        <a:lstStyle/>
+        <a:p>
+          <a:pPr lvl="0" algn="ctr" defTabSz="711200">
+            <a:lnSpc>
+              <a:spcPct val="90000"/>
+            </a:lnSpc>
+            <a:spcBef>
+              <a:spcPct val="0"/>
+            </a:spcBef>
+            <a:spcAft>
+              <a:spcPct val="35000"/>
+            </a:spcAft>
+          </a:pPr>
+          <a:r>
+            <a:rPr lang="en-US" sz="1600" kern="1200" dirty="0" smtClean="0"/>
+            <a:t> </a:t>
+          </a:r>
+          <a:endParaRPr lang="en-US" sz="1600" kern="1200" dirty="0"/>
+        </a:p>
+      </dsp:txBody>
+      <dsp:txXfrm>
+        <a:off x="1424551" y="868978"/>
+        <a:ext cx="967320" cy="566298"/>
+      </dsp:txXfrm>
+    </dsp:sp>
+    <dsp:sp modelId="{D7E6BFD9-07A3-C64B-9399-EE30EC59A042}">
+      <dsp:nvSpPr>
+        <dsp:cNvPr id="0" name=""/>
+        <dsp:cNvSpPr/>
+      </dsp:nvSpPr>
+      <dsp:spPr>
+        <a:xfrm>
+          <a:off x="2509746" y="1027810"/>
+          <a:ext cx="212542" cy="248634"/>
+        </a:xfrm>
+        <a:prstGeom prst="rightArrow">
+          <a:avLst>
+            <a:gd name="adj1" fmla="val 60000"/>
+            <a:gd name="adj2" fmla="val 50000"/>
+          </a:avLst>
+        </a:prstGeom>
+        <a:gradFill rotWithShape="0">
+          <a:gsLst>
+            <a:gs pos="0">
+              <a:schemeClr val="accent1">
+                <a:tint val="60000"/>
+                <a:hueOff val="0"/>
+                <a:satOff val="0"/>
+                <a:lumOff val="0"/>
+                <a:alphaOff val="0"/>
+                <a:shade val="51000"/>
+                <a:satMod val="130000"/>
+              </a:schemeClr>
+            </a:gs>
+            <a:gs pos="80000">
+              <a:schemeClr val="accent1">
+                <a:tint val="60000"/>
+                <a:hueOff val="0"/>
+                <a:satOff val="0"/>
+                <a:lumOff val="0"/>
+                <a:alphaOff val="0"/>
+                <a:shade val="93000"/>
+                <a:satMod val="130000"/>
+              </a:schemeClr>
+            </a:gs>
+            <a:gs pos="100000">
+              <a:schemeClr val="accent1">
+                <a:tint val="60000"/>
+                <a:hueOff val="0"/>
+                <a:satOff val="0"/>
+                <a:lumOff val="0"/>
+                <a:alphaOff val="0"/>
+                <a:shade val="94000"/>
+                <a:satMod val="135000"/>
+              </a:schemeClr>
+            </a:gs>
+          </a:gsLst>
+          <a:lin ang="16200000" scaled="0"/>
+        </a:gradFill>
+        <a:ln>
+          <a:noFill/>
+        </a:ln>
+        <a:effectLst>
+          <a:outerShdw blurRad="40000" dist="23000" dir="5400000" rotWithShape="0">
+            <a:srgbClr val="000000">
+              <a:alpha val="35000"/>
+            </a:srgbClr>
+          </a:outerShdw>
+        </a:effectLst>
+      </dsp:spPr>
+      <dsp:style>
+        <a:lnRef idx="0">
+          <a:scrgbClr r="0" g="0" b="0"/>
+        </a:lnRef>
+        <a:fillRef idx="3">
+          <a:scrgbClr r="0" g="0" b="0"/>
+        </a:fillRef>
+        <a:effectRef idx="2">
+          <a:scrgbClr r="0" g="0" b="0"/>
+        </a:effectRef>
+        <a:fontRef idx="minor">
+          <a:schemeClr val="lt1"/>
+        </a:fontRef>
+      </dsp:style>
+      <dsp:txBody>
+        <a:bodyPr spcFirstLastPara="0" vert="horz" wrap="square" lIns="0" tIns="0" rIns="0" bIns="0" numCol="1" spcCol="1270" anchor="ctr" anchorCtr="0">
+          <a:noAutofit/>
+        </a:bodyPr>
+        <a:lstStyle/>
+        <a:p>
+          <a:pPr lvl="0" algn="ctr" defTabSz="444500">
+            <a:lnSpc>
+              <a:spcPct val="90000"/>
+            </a:lnSpc>
+            <a:spcBef>
+              <a:spcPct val="0"/>
+            </a:spcBef>
+            <a:spcAft>
+              <a:spcPct val="35000"/>
+            </a:spcAft>
+          </a:pPr>
+          <a:endParaRPr lang="en-US" sz="1000" kern="1200"/>
+        </a:p>
+      </dsp:txBody>
+      <dsp:txXfrm>
+        <a:off x="2509746" y="1077537"/>
+        <a:ext cx="148779" cy="149180"/>
+      </dsp:txXfrm>
+    </dsp:sp>
+    <dsp:sp modelId="{A7CEAFEB-AFA1-0349-AD09-A062A478B8A0}">
+      <dsp:nvSpPr>
+        <dsp:cNvPr id="0" name=""/>
+        <dsp:cNvSpPr/>
+      </dsp:nvSpPr>
+      <dsp:spPr>
+        <a:xfrm>
+          <a:off x="2810513" y="851360"/>
+          <a:ext cx="1002556" cy="601534"/>
+        </a:xfrm>
+        <a:prstGeom prst="roundRect">
+          <a:avLst>
+            <a:gd name="adj" fmla="val 10000"/>
+          </a:avLst>
+        </a:prstGeom>
+        <a:gradFill rotWithShape="0">
+          <a:gsLst>
+            <a:gs pos="0">
+              <a:schemeClr val="accent1">
+                <a:hueOff val="0"/>
+                <a:satOff val="0"/>
+                <a:lumOff val="0"/>
+                <a:alphaOff val="0"/>
+                <a:shade val="51000"/>
+                <a:satMod val="130000"/>
+              </a:schemeClr>
+            </a:gs>
+            <a:gs pos="80000">
+              <a:schemeClr val="accent1">
+                <a:hueOff val="0"/>
+                <a:satOff val="0"/>
+                <a:lumOff val="0"/>
+                <a:alphaOff val="0"/>
+                <a:shade val="93000"/>
+                <a:satMod val="130000"/>
+              </a:schemeClr>
+            </a:gs>
+            <a:gs pos="100000">
+              <a:schemeClr val="accent1">
+                <a:hueOff val="0"/>
+                <a:satOff val="0"/>
+                <a:lumOff val="0"/>
+                <a:alphaOff val="0"/>
+                <a:shade val="94000"/>
+                <a:satMod val="135000"/>
+              </a:schemeClr>
+            </a:gs>
+          </a:gsLst>
+          <a:lin ang="16200000" scaled="0"/>
+        </a:gradFill>
+        <a:ln>
+          <a:noFill/>
+        </a:ln>
+        <a:effectLst>
+          <a:outerShdw blurRad="40000" dist="23000" dir="5400000" rotWithShape="0">
+            <a:srgbClr val="000000">
+              <a:alpha val="35000"/>
+            </a:srgbClr>
+          </a:outerShdw>
+        </a:effectLst>
+      </dsp:spPr>
+      <dsp:style>
+        <a:lnRef idx="0">
+          <a:scrgbClr r="0" g="0" b="0"/>
+        </a:lnRef>
+        <a:fillRef idx="3">
+          <a:scrgbClr r="0" g="0" b="0"/>
+        </a:fillRef>
+        <a:effectRef idx="2">
+          <a:scrgbClr r="0" g="0" b="0"/>
+        </a:effectRef>
+        <a:fontRef idx="minor">
+          <a:schemeClr val="lt1"/>
+        </a:fontRef>
+      </dsp:style>
+      <dsp:txBody>
+        <a:bodyPr spcFirstLastPara="0" vert="horz" wrap="square" lIns="60960" tIns="60960" rIns="60960" bIns="60960" numCol="1" spcCol="1270" anchor="ctr" anchorCtr="0">
+          <a:noAutofit/>
+        </a:bodyPr>
+        <a:lstStyle/>
+        <a:p>
+          <a:pPr lvl="0" algn="ctr" defTabSz="711200">
+            <a:lnSpc>
+              <a:spcPct val="90000"/>
+            </a:lnSpc>
+            <a:spcBef>
+              <a:spcPct val="0"/>
+            </a:spcBef>
+            <a:spcAft>
+              <a:spcPct val="35000"/>
+            </a:spcAft>
+          </a:pPr>
+          <a:r>
+            <a:rPr lang="en-US" sz="1600" kern="1200" dirty="0" smtClean="0"/>
+            <a:t> Smart Art</a:t>
+          </a:r>
+          <a:endParaRPr lang="en-US" sz="1600" kern="1200" dirty="0"/>
+        </a:p>
+      </dsp:txBody>
+      <dsp:txXfrm>
+        <a:off x="2828131" y="868978"/>
+        <a:ext cx="967320" cy="566298"/>
+      </dsp:txXfrm>
+    </dsp:sp>
+  </dsp:spTree>
+</dsp:drawing>
+</file>
+
+<file path=ppt/diagrams/layout1.xml><?xml version="1.0" encoding="utf-8"?>
+<dgm:layoutDef xmlns:dgm="http://schemas.openxmlformats.org/drawingml/2006/diagram" xmlns:a="http://schemas.openxmlformats.org/drawingml/2006/main" uniqueId="urn:microsoft.com/office/officeart/2005/8/layout/process1">
+  <dgm:title val=""/>
+  <dgm:desc val=""/>
+  <dgm:catLst>
+    <dgm:cat type="process" pri="1000"/>
+    <dgm:cat type="convert" pri="15000"/>
+  </dgm:catLst>
+  <dgm:sampData useDef="1">
+    <dgm:dataModel>
+      <dgm:ptLst/>
+      <dgm:bg/>
+      <dgm:whole/>
+    </dgm:dataModel>
+  </dgm:sampData>
+  <dgm:styleData>
+    <dgm:dataModel>
+      <dgm:ptLst>
+        <dgm:pt modelId="0" type="doc"/>
+        <dgm:pt modelId="1"/>
+        <dgm:pt modelId="2"/>
+      </dgm:ptLst>
+      <dgm:cxnLst>
+        <dgm:cxn modelId="3" srcId="0" destId="1" srcOrd="0" destOrd="0"/>
+        <dgm:cxn modelId="4" srcId="0" destId="2" srcOrd="1" destOrd="0"/>
+      </dgm:cxnLst>
+      <dgm:bg/>
+      <dgm:whole/>
+    </dgm:dataModel>
+  </dgm:styleData>
+  <dgm:clrData>
+    <dgm:dataModel>
+      <dgm:ptLst>
+        <dgm:pt modelId="0" type="doc"/>
+        <dgm:pt modelId="1"/>
+        <dgm:pt modelId="2"/>
+        <dgm:pt modelId="3"/>
+        <dgm:pt modelId="4"/>
+      </dgm:ptLst>
+      <dgm:cxnLst>
+        <dgm:cxn modelId="5" srcId="0" destId="1" srcOrd="0" destOrd="0"/>
+        <dgm:cxn modelId="6" srcId="0" destId="2" srcOrd="1" destOrd="0"/>
+        <dgm:cxn modelId="7" srcId="0" destId="3" srcOrd="2" destOrd="0"/>
+        <dgm:cxn modelId="8" srcId="0" destId="4" srcOrd="3" destOrd="0"/>
+      </dgm:cxnLst>
+      <dgm:bg/>
+      <dgm:whole/>
+    </dgm:dataModel>
+  </dgm:clrData>
+  <dgm:layoutNode name="Name0">
+    <dgm:varLst>
+      <dgm:dir/>
+      <dgm:resizeHandles val="exact"/>
+    </dgm:varLst>
+    <dgm:choose name="Name1">
+      <dgm:if name="Name2" func="var" arg="dir" op="equ" val="norm">
+        <dgm:alg type="lin"/>
+      </dgm:if>
+      <dgm:else name="Name3">
+        <dgm:alg type="lin">
+          <dgm:param type="linDir" val="fromR"/>
+        </dgm:alg>
+      </dgm:else>
+    </dgm:choose>
+    <dgm:shape xmlns:r="http://schemas.openxmlformats.org/officeDocument/2006/relationships" r:blip="">
+      <dgm:adjLst/>
+    </dgm:shape>
+    <dgm:presOf/>
+    <dgm:constrLst>
+      <dgm:constr type="w" for="ch" ptType="node" refType="w"/>
+      <dgm:constr type="h" for="ch" ptType="node" op="equ"/>
+      <dgm:constr type="primFontSz" for="ch" ptType="node" op="equ" val="65"/>
+      <dgm:constr type="w" for="ch" ptType="sibTrans" refType="w" refFor="ch" refPtType="node" op="equ" fact="0.4"/>
+      <dgm:constr type="h" for="ch" ptType="sibTrans" op="equ"/>
+      <dgm:constr type="primFontSz" for="des" forName="connectorText" op="equ" val="55"/>
+      <dgm:constr type="primFontSz" for="des" forName="connectorText" refType="primFontSz" refFor="ch" refPtType="node" op="lte" fact="0.8"/>
+    </dgm:constrLst>
+    <dgm:ruleLst/>
+    <dgm:forEach name="nodesForEach" axis="ch" ptType="node">
+      <dgm:layoutNode name="node">
+        <dgm:varLst>
+          <dgm:bulletEnabled val="1"/>
+        </dgm:varLst>
+        <dgm:alg type="tx"/>
+        <dgm:shape xmlns:r="http://schemas.openxmlformats.org/officeDocument/2006/relationships" type="roundRect" r:blip="">
+          <dgm:adjLst>
+            <dgm:adj idx="1" val="0.1"/>
+          </dgm:adjLst>
+        </dgm:shape>
+        <dgm:presOf axis="desOrSelf" ptType="node"/>
+        <dgm:constrLst>
+          <dgm:constr type="h" refType="w" fact="0.6"/>
+          <dgm:constr type="tMarg" refType="primFontSz" fact="0.3"/>
+          <dgm:constr type="bMarg" refType="primFontSz" fact="0.3"/>
+          <dgm:constr type="lMarg" refType="primFontSz" fact="0.3"/>
+          <dgm:constr type="rMarg" refType="primFontSz" fact="0.3"/>
+        </dgm:constrLst>
+        <dgm:ruleLst>
+          <dgm:rule type="primFontSz" val="18" fact="NaN" max="NaN"/>
+          <dgm:rule type="h" val="NaN" fact="1.5" max="NaN"/>
+          <dgm:rule type="primFontSz" val="5" fact="NaN" max="NaN"/>
+          <dgm:rule type="h" val="INF" fact="NaN" max="NaN"/>
+        </dgm:ruleLst>
+      </dgm:layoutNode>
+      <dgm:forEach name="sibTransForEach" axis="followSib" ptType="sibTrans" cnt="1">
+        <dgm:layoutNode name="sibTrans">
+          <dgm:alg type="conn">
+            <dgm:param type="begPts" val="auto"/>
+            <dgm:param type="endPts" val="auto"/>
+          </dgm:alg>
+          <dgm:shape xmlns:r="http://schemas.openxmlformats.org/officeDocument/2006/relationships" type="conn" r:blip="">
+            <dgm:adjLst/>
+          </dgm:shape>
+          <dgm:presOf axis="self"/>
+          <dgm:constrLst>
+            <dgm:constr type="h" refType="w" fact="0.62"/>
+            <dgm:constr type="connDist"/>
+            <dgm:constr type="begPad" refType="connDist" fact="0.25"/>
+            <dgm:constr type="endPad" refType="connDist" fact="0.22"/>
+          </dgm:constrLst>
+          <dgm:ruleLst/>
+          <dgm:layoutNode name="connectorText">
+            <dgm:alg type="tx">
+              <dgm:param type="autoTxRot" val="grav"/>
+            </dgm:alg>
+            <dgm:shape xmlns:r="http://schemas.openxmlformats.org/officeDocument/2006/relationships" type="conn" r:blip="" hideGeom="1">
+              <dgm:adjLst/>
+            </dgm:shape>
+            <dgm:presOf axis="self"/>
+            <dgm:constrLst>
+              <dgm:constr type="lMarg"/>
+              <dgm:constr type="rMarg"/>
+              <dgm:constr type="tMarg"/>
+              <dgm:constr type="bMarg"/>
+            </dgm:constrLst>
+            <dgm:ruleLst>
+              <dgm:rule type="primFontSz" val="5" fact="NaN" max="NaN"/>
+            </dgm:ruleLst>
+          </dgm:layoutNode>
+        </dgm:layoutNode>
+      </dgm:forEach>
+    </dgm:forEach>
+  </dgm:layoutNode>
+</dgm:layoutDef>
+</file>
+
+<file path=ppt/diagrams/quickStyle1.xml><?xml version="1.0" encoding="utf-8"?>
+<dgm:styleDef xmlns:dgm="http://schemas.openxmlformats.org/drawingml/2006/diagram" xmlns:a="http://schemas.openxmlformats.org/drawingml/2006/main" uniqueId="urn:microsoft.com/office/officeart/2005/8/quickstyle/simple4">
+  <dgm:title val=""/>
+  <dgm:desc val=""/>
+  <dgm:catLst>
+    <dgm:cat type="simple" pri="10400"/>
+  </dgm:catLst>
+  <dgm:scene3d>
+    <a:camera prst="orthographicFront"/>
+    <a:lightRig rig="threePt" dir="t"/>
+  </dgm:scene3d>
+  <dgm:styleLbl name="node0">
+    <dgm:scene3d>
+      <a:camera prst="orthographicFront"/>
+      <a:lightRig rig="threePt" dir="t"/>
+    </dgm:scene3d>
+    <dgm:sp3d/>
+    <dgm:txPr/>
+    <dgm:style>
+      <a:lnRef idx="0">
+        <a:scrgbClr r="0" g="0" b="0"/>
+      </a:lnRef>
+      <a:fillRef idx="3">
+        <a:scrgbClr r="0" g="0" b="0"/>
+      </a:fillRef>
+      <a:effectRef idx="2">
+        <a:scrgbClr r="0" g="0" b="0"/>
+      </a:effectRef>
+      <a:fontRef idx="minor">
+        <a:schemeClr val="lt1"/>
+      </a:fontRef>
+    </dgm:style>
+  </dgm:styleLbl>
+  <dgm:styleLbl name="lnNode1">
+    <dgm:scene3d>
+      <a:camera prst="orthographicFront"/>
+      <a:lightRig rig="threePt" dir="t"/>
+    </dgm:scene3d>
+    <dgm:sp3d/>
+    <dgm:txPr/>
+    <dgm:style>
+      <a:lnRef idx="1">
+        <a:scrgbClr r="0" g="0" b="0"/>
+      </a:lnRef>
+      <a:fillRef idx="3">
+        <a:scrgbClr r="0" g="0" b="0"/>
+      </a:fillRef>
+      <a:effectRef idx="2">
+        <a:scrgbClr r="0" g="0" b="0"/>
+      </a:effectRef>
+      <a:fontRef idx="minor">
+        <a:schemeClr val="lt1"/>
+      </a:fontRef>
+    </dgm:style>
+  </dgm:styleLbl>
+  <dgm:styleLbl name="vennNode1">
+    <dgm:scene3d>
+      <a:camera prst="orthographicFront"/>
+      <a:lightRig rig="threePt" dir="t"/>
+    </dgm:scene3d>
+    <dgm:sp3d/>
+    <dgm:txPr/>
+    <dgm:style>
+      <a:lnRef idx="0">
+        <a:scrgbClr r="0" g="0" b="0"/>
+      </a:lnRef>
+      <a:fillRef idx="3">
+        <a:scrgbClr r="0" g="0" b="0"/>
+      </a:fillRef>
+      <a:effectRef idx="0">
+        <a:scrgbClr r="0" g="0" b="0"/>
+      </a:effectRef>
+      <a:fontRef idx="minor">
+        <a:schemeClr val="tx1"/>
+      </a:fontRef>
+    </dgm:style>
+  </dgm:styleLbl>
+  <dgm:styleLbl name="alignNode1">
+    <dgm:scene3d>
+      <a:camera prst="orthographicFront"/>
+      <a:lightRig rig="threePt" dir="t"/>
+    </dgm:scene3d>
+    <dgm:sp3d/>
+    <dgm:txPr/>
+    <dgm:style>
+      <a:lnRef idx="1">
+        <a:scrgbClr r="0" g="0" b="0"/>
+      </a:lnRef>
+      <a:fillRef idx="3">
+        <a:scrgbClr r="0" g="0" b="0"/>
+      </a:fillRef>
+      <a:effectRef idx="2">
+        <a:scrgbClr r="0" g="0" b="0"/>
+      </a:effectRef>
+      <a:fontRef idx="minor">
+        <a:schemeClr val="lt1"/>
+      </a:fontRef>
+    </dgm:style>
+  </dgm:styleLbl>
+  <dgm:styleLbl name="node1">
+    <dgm:scene3d>
+      <a:camera prst="orthographicFront"/>
+      <a:lightRig rig="threePt" dir="t"/>
+    </dgm:scene3d>
+    <dgm:sp3d/>
+    <dgm:txPr/>
+    <dgm:style>
+      <a:lnRef idx="0">
+        <a:scrgbClr r="0" g="0" b="0"/>
+      </a:lnRef>
+      <a:fillRef idx="3">
+        <a:scrgbClr r="0" g="0" b="0"/>
+      </a:fillRef>
+      <a:effectRef idx="2">
+        <a:scrgbClr r="0" g="0" b="0"/>
+      </a:effectRef>
+      <a:fontRef idx="minor">
+        <a:schemeClr val="lt1"/>
+      </a:fontRef>
+    </dgm:style>
+  </dgm:styleLbl>
+  <dgm:styleLbl name="node2">
+    <dgm:scene3d>
+      <a:camera prst="orthographicFront"/>
+      <a:lightRig rig="threePt" dir="t"/>
+    </dgm:scene3d>
+    <dgm:sp3d/>
+    <dgm:txPr/>
+    <dgm:style>
+      <a:lnRef idx="0">
+        <a:scrgbClr r="0" g="0" b="0"/>
+      </a:lnRef>
+      <a:fillRef idx="3">
+        <a:scrgbClr r="0" g="0" b="0"/>
+      </a:fillRef>
+      <a:effectRef idx="2">
+        <a:scrgbClr r="0" g="0" b="0"/>
+      </a:effectRef>
+      <a:fontRef idx="minor">
+        <a:schemeClr val="lt1"/>
+      </a:fontRef>
+    </dgm:style>
+  </dgm:styleLbl>
+  <dgm:styleLbl name="node3">
+    <dgm:scene3d>
+      <a:camera prst="orthographicFront"/>
+      <a:lightRig rig="threePt" dir="t"/>
+    </dgm:scene3d>
+    <dgm:sp3d/>
+    <dgm:txPr/>
+    <dgm:style>
+      <a:lnRef idx="0">
+        <a:scrgbClr r="0" g="0" b="0"/>
+      </a:lnRef>
+      <a:fillRef idx="3">
+        <a:scrgbClr r="0" g="0" b="0"/>
+      </a:fillRef>
+      <a:effectRef idx="2">
+        <a:scrgbClr r="0" g="0" b="0"/>
+      </a:effectRef>
+      <a:fontRef idx="minor">
+        <a:schemeClr val="lt1"/>
+      </a:fontRef>
+    </dgm:style>
+  </dgm:styleLbl>
+  <dgm:styleLbl name="node4">
+    <dgm:scene3d>
+      <a:camera prst="orthographicFront"/>
+      <a:lightRig rig="threePt" dir="t"/>
+    </dgm:scene3d>
+    <dgm:sp3d/>
+    <dgm:txPr/>
+    <dgm:style>
+      <a:lnRef idx="0">
+        <a:scrgbClr r="0" g="0" b="0"/>
+      </a:lnRef>
+      <a:fillRef idx="3">
+        <a:scrgbClr r="0" g="0" b="0"/>
+      </a:fillRef>
+      <a:effectRef idx="2">
+        <a:scrgbClr r="0" g="0" b="0"/>
+      </a:effectRef>
+      <a:fontRef idx="minor">
+        <a:schemeClr val="lt1"/>
+      </a:fontRef>
+    </dgm:style>
+  </dgm:styleLbl>
+  <dgm:styleLbl name="fgImgPlace1">
+    <dgm:scene3d>
+      <a:camera prst="orthographicFront"/>
+      <a:lightRig rig="threePt" dir="t"/>
+    </dgm:scene3d>
+    <dgm:sp3d/>
+    <dgm:txPr/>
+    <dgm:style>
+      <a:lnRef idx="0">
+        <a:scrgbClr r="0" g="0" b="0"/>
+      </a:lnRef>
+      <a:fillRef idx="1">
+        <a:scrgbClr r="0" g="0" b="0"/>
+      </a:fillRef>
+      <a:effectRef idx="2">
+        <a:scrgbClr r="0" g="0" b="0"/>
+      </a:effectRef>
+      <a:fontRef idx="minor"/>
+    </dgm:style>
+  </dgm:styleLbl>
+  <dgm:styleLbl name="alignImgPlace1">
+    <dgm:scene3d>
+      <a:camera prst="orthographicFront"/>
+      <a:lightRig rig="threePt" dir="t"/>
+    </dgm:scene3d>
+    <dgm:sp3d/>
+    <dgm:txPr/>
+    <dgm:style>
+      <a:lnRef idx="0">
+        <a:scrgbClr r="0" g="0" b="0"/>
+      </a:lnRef>
+      <a:fillRef idx="1">
+        <a:scrgbClr r="0" g="0" b="0"/>
+      </a:fillRef>
+      <a:effectRef idx="2">
+        <a:scrgbClr r="0" g="0" b="0"/>
+      </a:effectRef>
+      <a:fontRef idx="minor"/>
+    </dgm:style>
+  </dgm:styleLbl>
+  <dgm:styleLbl name="bgImgPlace1">
+    <dgm:scene3d>
+      <a:camera prst="orthographicFront"/>
+      <a:lightRig rig="threePt" dir="t"/>
+    </dgm:scene3d>
+    <dgm:sp3d/>
+    <dgm:txPr/>
+    <dgm:style>
+      <a:lnRef idx="0">
+        <a:scrgbClr r="0" g="0" b="0"/>
+      </a:lnRef>
+      <a:fillRef idx="1">
+        <a:scrgbClr r="0" g="0" b="0"/>
+      </a:fillRef>
+      <a:effectRef idx="2">
+        <a:scrgbClr r="0" g="0" b="0"/>
+      </a:effectRef>
+      <a:fontRef idx="minor"/>
+    </dgm:style>
+  </dgm:styleLbl>
+  <dgm:styleLbl name="sibTrans2D1">
+    <dgm:scene3d>
+      <a:camera prst="orthographicFront"/>
+      <a:lightRig rig="threePt" dir="t"/>
+    </dgm:scene3d>
+    <dgm:sp3d/>
+    <dgm:txPr/>
+    <dgm:style>
+      <a:lnRef idx="0">
+        <a:scrgbClr r="0" g="0" b="0"/>
+      </a:lnRef>
+      <a:fillRef idx="3">
+        <a:scrgbClr r="0" g="0" b="0"/>
+      </a:fillRef>
+      <a:effectRef idx="2">
+        <a:scrgbClr r="0" g="0" b="0"/>
+      </a:effectRef>
+      <a:fontRef idx="minor">
+        <a:schemeClr val="lt1"/>
+      </a:fontRef>
+    </dgm:style>
+  </dgm:styleLbl>
+  <dgm:styleLbl name="fgSibTrans2D1">
+    <dgm:scene3d>
+      <a:camera prst="orthographicFront"/>
+      <a:lightRig rig="threePt" dir="t"/>
+    </dgm:scene3d>
+    <dgm:sp3d/>
+    <dgm:txPr/>
+    <dgm:style>
+      <a:lnRef idx="0">
+        <a:scrgbClr r="0" g="0" b="0"/>
+      </a:lnRef>
+      <a:fillRef idx="3">
+        <a:scrgbClr r="0" g="0" b="0"/>
+      </a:fillRef>
+      <a:effectRef idx="2">
+        <a:scrgbClr r="0" g="0" b="0"/>
+      </a:effectRef>
+      <a:fontRef idx="minor">
+        <a:schemeClr val="lt1"/>
+      </a:fontRef>
+    </dgm:style>
+  </dgm:styleLbl>
+  <dgm:styleLbl name="bgSibTrans2D1">
+    <dgm:scene3d>
+      <a:camera prst="orthographicFront"/>
+      <a:lightRig rig="threePt" dir="t"/>
+    </dgm:scene3d>
+    <dgm:sp3d/>
+    <dgm:txPr/>
+    <dgm:style>
+      <a:lnRef idx="0">
+        <a:scrgbClr r="0" g="0" b="0"/>
+      </a:lnRef>
+      <a:fillRef idx="3">
+        <a:scrgbClr r="0" g="0" b="0"/>
+      </a:fillRef>
+      <a:effectRef idx="2">
+        <a:scrgbClr r="0" g="0" b="0"/>
+      </a:effectRef>
+      <a:fontRef idx="minor">
+        <a:schemeClr val="lt1"/>
+      </a:fontRef>
+    </dgm:style>
+  </dgm:styleLbl>
+  <dgm:styleLbl name="sibTrans1D1">
+    <dgm:scene3d>
+      <a:camera prst="orthographicFront"/>
+      <a:lightRig rig="threePt" dir="t"/>
+    </dgm:scene3d>
+    <dgm:sp3d/>
+    <dgm:txPr/>
+    <dgm:style>
+      <a:lnRef idx="1">
+        <a:scrgbClr r="0" g="0" b="0"/>
+      </a:lnRef>
+      <a:fillRef idx="0">
+        <a:scrgbClr r="0" g="0" b="0"/>
+      </a:fillRef>
+      <a:effectRef idx="0">
+        <a:scrgbClr r="0" g="0" b="0"/>
+      </a:effectRef>
+      <a:fontRef idx="minor"/>
+    </dgm:style>
+  </dgm:styleLbl>
+  <dgm:styleLbl name="callout">
+    <dgm:scene3d>
+      <a:camera prst="orthographicFront"/>
+      <a:lightRig rig="threePt" dir="t"/>
+    </dgm:scene3d>
+    <dgm:sp3d/>
+    <dgm:txPr/>
+    <dgm:style>
+      <a:lnRef idx="2">
+        <a:scrgbClr r="0" g="0" b="0"/>
+      </a:lnRef>
+      <a:fillRef idx="1">
+        <a:scrgbClr r="0" g="0" b="0"/>
+      </a:fillRef>
+      <a:effectRef idx="1">
+        <a:scrgbClr r="0" g="0" b="0"/>
+      </a:effectRef>
+      <a:fontRef idx="minor"/>
+    </dgm:style>
+  </dgm:styleLbl>
+  <dgm:styleLbl name="asst0">
+    <dgm:scene3d>
+      <a:camera prst="orthographicFront"/>
+      <a:lightRig rig="threePt" dir="t"/>
+    </dgm:scene3d>
+    <dgm:sp3d/>
+    <dgm:txPr/>
+    <dgm:style>
+      <a:lnRef idx="0">
+        <a:scrgbClr r="0" g="0" b="0"/>
+      </a:lnRef>
+      <a:fillRef idx="3">
+        <a:scrgbClr r="0" g="0" b="0"/>
+      </a:fillRef>
+      <a:effectRef idx="2">
+        <a:scrgbClr r="0" g="0" b="0"/>
+      </a:effectRef>
+      <a:fontRef idx="minor">
+        <a:schemeClr val="lt1"/>
+      </a:fontRef>
+    </dgm:style>
+  </dgm:styleLbl>
+  <dgm:styleLbl name="asst1">
+    <dgm:scene3d>
+      <a:camera prst="orthographicFront"/>
+      <a:lightRig rig="threePt" dir="t"/>
+    </dgm:scene3d>
+    <dgm:sp3d/>
+    <dgm:txPr/>
+    <dgm:style>
+      <a:lnRef idx="0">
+        <a:scrgbClr r="0" g="0" b="0"/>
+      </a:lnRef>
+      <a:fillRef idx="3">
+        <a:scrgbClr r="0" g="0" b="0"/>
+      </a:fillRef>
+      <a:effectRef idx="2">
+        <a:scrgbClr r="0" g="0" b="0"/>
+      </a:effectRef>
+      <a:fontRef idx="minor">
+        <a:schemeClr val="lt1"/>
+      </a:fontRef>
+    </dgm:style>
+  </dgm:styleLbl>
+  <dgm:styleLbl name="asst2">
+    <dgm:scene3d>
+      <a:camera prst="orthographicFront"/>
+      <a:lightRig rig="threePt" dir="t"/>
+    </dgm:scene3d>
+    <dgm:sp3d/>
+    <dgm:txPr/>
+    <dgm:style>
+      <a:lnRef idx="0">
+        <a:scrgbClr r="0" g="0" b="0"/>
+      </a:lnRef>
+      <a:fillRef idx="3">
+        <a:scrgbClr r="0" g="0" b="0"/>
+      </a:fillRef>
+      <a:effectRef idx="2">
+        <a:scrgbClr r="0" g="0" b="0"/>
+      </a:effectRef>
+      <a:fontRef idx="minor">
+        <a:schemeClr val="lt1"/>
+      </a:fontRef>
+    </dgm:style>
+  </dgm:styleLbl>
+  <dgm:styleLbl name="asst3">
+    <dgm:scene3d>
+      <a:camera prst="orthographicFront"/>
+      <a:lightRig rig="threePt" dir="t"/>
+    </dgm:scene3d>
+    <dgm:sp3d/>
+    <dgm:txPr/>
+    <dgm:style>
+      <a:lnRef idx="0">
+        <a:scrgbClr r="0" g="0" b="0"/>
+      </a:lnRef>
+      <a:fillRef idx="3">
+        <a:scrgbClr r="0" g="0" b="0"/>
+      </a:fillRef>
+      <a:effectRef idx="2">
+        <a:scrgbClr r="0" g="0" b="0"/>
+      </a:effectRef>
+      <a:fontRef idx="minor">
+        <a:schemeClr val="lt1"/>
+      </a:fontRef>
+    </dgm:style>
+  </dgm:styleLbl>
+  <dgm:styleLbl name="asst4">
+    <dgm:scene3d>
+      <a:camera prst="orthographicFront"/>
+      <a:lightRig rig="threePt" dir="t"/>
+    </dgm:scene3d>
+    <dgm:sp3d/>
+    <dgm:txPr/>
+    <dgm:style>
+      <a:lnRef idx="0">
+        <a:scrgbClr r="0" g="0" b="0"/>
+      </a:lnRef>
+      <a:fillRef idx="3">
+        <a:scrgbClr r="0" g="0" b="0"/>
+      </a:fillRef>
+      <a:effectRef idx="2">
+        <a:scrgbClr r="0" g="0" b="0"/>
+      </a:effectRef>
+      <a:fontRef idx="minor">
+        <a:schemeClr val="lt1"/>
+      </a:fontRef>
+    </dgm:style>
+  </dgm:styleLbl>
+  <dgm:styleLbl name="parChTrans2D1">
+    <dgm:scene3d>
+      <a:camera prst="orthographicFront"/>
+      <a:lightRig rig="threePt" dir="t"/>
+    </dgm:scene3d>
+    <dgm:sp3d/>
+    <dgm:txPr/>
+    <dgm:style>
+      <a:lnRef idx="0">
+        <a:scrgbClr r="0" g="0" b="0"/>
+      </a:lnRef>
+      <a:fillRef idx="3">
+        <a:scrgbClr r="0" g="0" b="0"/>
+      </a:fillRef>
+      <a:effectRef idx="2">
+        <a:scrgbClr r="0" g="0" b="0"/>
+      </a:effectRef>
+      <a:fontRef idx="minor">
+        <a:schemeClr val="lt1"/>
+      </a:fontRef>
+    </dgm:style>
+  </dgm:styleLbl>
+  <dgm:styleLbl name="parChTrans2D2">
+    <dgm:scene3d>
+      <a:camera prst="orthographicFront"/>
+      <a:lightRig rig="threePt" dir="t"/>
+    </dgm:scene3d>
+    <dgm:sp3d/>
+    <dgm:txPr/>
+    <dgm:style>
+      <a:lnRef idx="0">
+        <a:scrgbClr r="0" g="0" b="0"/>
+      </a:lnRef>
+      <a:fillRef idx="3">
+        <a:scrgbClr r="0" g="0" b="0"/>
+      </a:fillRef>
+      <a:effectRef idx="2">
+        <a:scrgbClr r="0" g="0" b="0"/>
+      </a:effectRef>
+      <a:fontRef idx="minor">
+        <a:schemeClr val="lt1"/>
+      </a:fontRef>
+    </dgm:style>
+  </dgm:styleLbl>
+  <dgm:styleLbl name="parChTrans2D3">
+    <dgm:scene3d>
+      <a:camera prst="orthographicFront"/>
+      <a:lightRig rig="threePt" dir="t"/>
+    </dgm:scene3d>
+    <dgm:sp3d/>
+    <dgm:txPr/>
+    <dgm:style>
+      <a:lnRef idx="1">
+        <a:scrgbClr r="0" g="0" b="0"/>
+      </a:lnRef>
+      <a:fillRef idx="3">
+        <a:scrgbClr r="0" g="0" b="0"/>
+      </a:fillRef>
+      <a:effectRef idx="2">
+        <a:scrgbClr r="0" g="0" b="0"/>
+      </a:effectRef>
+      <a:fontRef idx="minor">
+        <a:schemeClr val="lt1"/>
+      </a:fontRef>
+    </dgm:style>
+  </dgm:styleLbl>
+  <dgm:styleLbl name="parChTrans2D4">
+    <dgm:scene3d>
+      <a:camera prst="orthographicFront"/>
+      <a:lightRig rig="threePt" dir="t"/>
+    </dgm:scene3d>
+    <dgm:sp3d/>
+    <dgm:txPr/>
+    <dgm:style>
+      <a:lnRef idx="1">
+        <a:scrgbClr r="0" g="0" b="0"/>
+      </a:lnRef>
+      <a:fillRef idx="3">
+        <a:scrgbClr r="0" g="0" b="0"/>
+      </a:fillRef>
+      <a:effectRef idx="2">
+        <a:scrgbClr r="0" g="0" b="0"/>
+      </a:effectRef>
+      <a:fontRef idx="minor">
+        <a:schemeClr val="lt1"/>
+      </a:fontRef>
+    </dgm:style>
+  </dgm:styleLbl>
+  <dgm:styleLbl name="parChTrans1D1">
+    <dgm:scene3d>
+      <a:camera prst="orthographicFront"/>
+      <a:lightRig rig="threePt" dir="t"/>
+    </dgm:scene3d>
+    <dgm:sp3d/>
+    <dgm:txPr/>
+    <dgm:style>
+      <a:lnRef idx="1">
+        <a:scrgbClr r="0" g="0" b="0"/>
+      </a:lnRef>
+      <a:fillRef idx="0">
+        <a:scrgbClr r="0" g="0" b="0"/>
+      </a:fillRef>
+      <a:effectRef idx="0">
+        <a:scrgbClr r="0" g="0" b="0"/>
+      </a:effectRef>
+      <a:fontRef idx="minor"/>
+    </dgm:style>
+  </dgm:styleLbl>
+  <dgm:styleLbl name="parChTrans1D2">
+    <dgm:scene3d>
+      <a:camera prst="orthographicFront"/>
+      <a:lightRig rig="threePt" dir="t"/>
+    </dgm:scene3d>
+    <dgm:sp3d/>
+    <dgm:txPr/>
+    <dgm:style>
+      <a:lnRef idx="1">
+        <a:scrgbClr r="0" g="0" b="0"/>
+      </a:lnRef>
+      <a:fillRef idx="0">
+        <a:scrgbClr r="0" g="0" b="0"/>
+      </a:fillRef>
+      <a:effectRef idx="0">
+        <a:scrgbClr r="0" g="0" b="0"/>
+      </a:effectRef>
+      <a:fontRef idx="minor"/>
+    </dgm:style>
+  </dgm:styleLbl>
+  <dgm:styleLbl name="parChTrans1D3">
+    <dgm:scene3d>
+      <a:camera prst="orthographicFront"/>
+      <a:lightRig rig="threePt" dir="t"/>
+    </dgm:scene3d>
+    <dgm:sp3d/>
+    <dgm:txPr/>
+    <dgm:style>
+      <a:lnRef idx="1">
+        <a:scrgbClr r="0" g="0" b="0"/>
+      </a:lnRef>
+      <a:fillRef idx="0">
+        <a:scrgbClr r="0" g="0" b="0"/>
+      </a:fillRef>
+      <a:effectRef idx="0">
+        <a:scrgbClr r="0" g="0" b="0"/>
+      </a:effectRef>
+      <a:fontRef idx="minor"/>
+    </dgm:style>
+  </dgm:styleLbl>
+  <dgm:styleLbl name="parChTrans1D4">
+    <dgm:scene3d>
+      <a:camera prst="orthographicFront"/>
+      <a:lightRig rig="threePt" dir="t"/>
+    </dgm:scene3d>
+    <dgm:sp3d/>
+    <dgm:txPr/>
+    <dgm:style>
+      <a:lnRef idx="1">
+        <a:scrgbClr r="0" g="0" b="0"/>
+      </a:lnRef>
+      <a:fillRef idx="0">
+        <a:scrgbClr r="0" g="0" b="0"/>
+      </a:fillRef>
+      <a:effectRef idx="0">
+        <a:scrgbClr r="0" g="0" b="0"/>
+      </a:effectRef>
+      <a:fontRef idx="minor"/>
+    </dgm:style>
+  </dgm:styleLbl>
+  <dgm:styleLbl name="fgAcc1">
+    <dgm:scene3d>
+      <a:camera prst="orthographicFront"/>
+      <a:lightRig rig="threePt" dir="t"/>
+    </dgm:scene3d>
+    <dgm:sp3d/>
+    <dgm:txPr/>
+    <dgm:style>
+      <a:lnRef idx="1">
+        <a:scrgbClr r="0" g="0" b="0"/>
+      </a:lnRef>
+      <a:fillRef idx="1">
+        <a:scrgbClr r="0" g="0" b="0"/>
+      </a:fillRef>
+      <a:effectRef idx="0">
+        <a:scrgbClr r="0" g="0" b="0"/>
+      </a:effectRef>
+      <a:fontRef idx="minor"/>
+    </dgm:style>
+  </dgm:styleLbl>
+  <dgm:styleLbl name="conFgAcc1">
+    <dgm:scene3d>
+      <a:camera prst="orthographicFront"/>
+      <a:lightRig rig="threePt" dir="t"/>
+    </dgm:scene3d>
+    <dgm:sp3d/>
+    <dgm:txPr/>
+    <dgm:style>
+      <a:lnRef idx="1">
+        <a:scrgbClr r="0" g="0" b="0"/>
+      </a:lnRef>
+      <a:fillRef idx="1">
+        <a:scrgbClr r="0" g="0" b="0"/>
+      </a:fillRef>
+      <a:effectRef idx="0">
+        <a:scrgbClr r="0" g="0" b="0"/>
+      </a:effectRef>
+      <a:fontRef idx="minor"/>
+    </dgm:style>
+  </dgm:styleLbl>
+  <dgm:styleLbl name="alignAcc1">
+    <dgm:scene3d>
+      <a:camera prst="orthographicFront"/>
+      <a:lightRig rig="threePt" dir="t"/>
+    </dgm:scene3d>
+    <dgm:sp3d/>
+    <dgm:txPr/>
+    <dgm:style>
+      <a:lnRef idx="1">
+        <a:scrgbClr r="0" g="0" b="0"/>
+      </a:lnRef>
+      <a:fillRef idx="1">
+        <a:scrgbClr r="0" g="0" b="0"/>
+      </a:fillRef>
+      <a:effectRef idx="0">
+        <a:scrgbClr r="0" g="0" b="0"/>
+      </a:effectRef>
+      <a:fontRef idx="minor"/>
+    </dgm:style>
+  </dgm:styleLbl>
+  <dgm:styleLbl name="trAlignAcc1">
+    <dgm:scene3d>
+      <a:camera prst="orthographicFront"/>
+      <a:lightRig rig="threePt" dir="t"/>
+    </dgm:scene3d>
+    <dgm:sp3d/>
+    <dgm:txPr/>
+    <dgm:style>
+      <a:lnRef idx="1">
+        <a:scrgbClr r="0" g="0" b="0"/>
+      </a:lnRef>
+      <a:fillRef idx="1">
+        <a:scrgbClr r="0" g="0" b="0"/>
+      </a:fillRef>
+      <a:effectRef idx="0">
+        <a:scrgbClr r="0" g="0" b="0"/>
+      </a:effectRef>
+      <a:fontRef idx="minor"/>
+    </dgm:style>
+  </dgm:styleLbl>
+  <dgm:styleLbl name="bgAcc1">
+    <dgm:scene3d>
+      <a:camera prst="orthographicFront"/>
+      <a:lightRig rig="threePt" dir="t"/>
+    </dgm:scene3d>
+    <dgm:sp3d/>
+    <dgm:txPr/>
+    <dgm:style>
+      <a:lnRef idx="1">
+        <a:scrgbClr r="0" g="0" b="0"/>
+      </a:lnRef>
+      <a:fillRef idx="1">
+        <a:scrgbClr r="0" g="0" b="0"/>
+      </a:fillRef>
+      <a:effectRef idx="0">
+        <a:scrgbClr r="0" g="0" b="0"/>
+      </a:effectRef>
+      <a:fontRef idx="minor"/>
+    </dgm:style>
+  </dgm:styleLbl>
+  <dgm:styleLbl name="solidFgAcc1">
+    <dgm:scene3d>
+      <a:camera prst="orthographicFront"/>
+      <a:lightRig rig="threePt" dir="t"/>
+    </dgm:scene3d>
+    <dgm:sp3d/>
+    <dgm:txPr/>
+    <dgm:style>
+      <a:lnRef idx="1">
+        <a:scrgbClr r="0" g="0" b="0"/>
+      </a:lnRef>
+      <a:fillRef idx="1">
+        <a:scrgbClr r="0" g="0" b="0"/>
+      </a:fillRef>
+      <a:effectRef idx="0">
+        <a:scrgbClr r="0" g="0" b="0"/>
+      </a:effectRef>
+      <a:fontRef idx="minor"/>
+    </dgm:style>
+  </dgm:styleLbl>
+  <dgm:styleLbl name="solidAlignAcc1">
+    <dgm:scene3d>
+      <a:camera prst="orthographicFront"/>
+      <a:lightRig rig="threePt" dir="t"/>
+    </dgm:scene3d>
+    <dgm:sp3d/>
+    <dgm:txPr/>
+    <dgm:style>
+      <a:lnRef idx="1">
+        <a:scrgbClr r="0" g="0" b="0"/>
+      </a:lnRef>
+      <a:fillRef idx="1">
+        <a:scrgbClr r="0" g="0" b="0"/>
+      </a:fillRef>
+      <a:effectRef idx="0">
+        <a:scrgbClr r="0" g="0" b="0"/>
+      </a:effectRef>
+      <a:fontRef idx="minor"/>
+    </dgm:style>
+  </dgm:styleLbl>
+  <dgm:styleLbl name="solidBgAcc1">
+    <dgm:scene3d>
+      <a:camera prst="orthographicFront"/>
+      <a:lightRig rig="threePt" dir="t"/>
+    </dgm:scene3d>
+    <dgm:sp3d/>
+    <dgm:txPr/>
+    <dgm:style>
+      <a:lnRef idx="1">
+        <a:scrgbClr r="0" g="0" b="0"/>
+      </a:lnRef>
+      <a:fillRef idx="1">
+        <a:scrgbClr r="0" g="0" b="0"/>
+      </a:fillRef>
+      <a:effectRef idx="0">
+        <a:scrgbClr r="0" g="0" b="0"/>
+      </a:effectRef>
+      <a:fontRef idx="minor"/>
+    </dgm:style>
+  </dgm:styleLbl>
+  <dgm:styleLbl name="fgAccFollowNode1">
+    <dgm:scene3d>
+      <a:camera prst="orthographicFront"/>
+      <a:lightRig rig="threePt" dir="t"/>
+    </dgm:scene3d>
+    <dgm:sp3d/>
+    <dgm:txPr/>
+    <dgm:style>
+      <a:lnRef idx="1">
+        <a:scrgbClr r="0" g="0" b="0"/>
+      </a:lnRef>
+      <a:fillRef idx="1">
+        <a:scrgbClr r="0" g="0" b="0"/>
+      </a:fillRef>
+      <a:effectRef idx="0">
+        <a:scrgbClr r="0" g="0" b="0"/>
+      </a:effectRef>
+      <a:fontRef idx="minor"/>
+    </dgm:style>
+  </dgm:styleLbl>
+  <dgm:styleLbl name="alignAccFollowNode1">
+    <dgm:scene3d>
+      <a:camera prst="orthographicFront"/>
+      <a:lightRig rig="threePt" dir="t"/>
+    </dgm:scene3d>
+    <dgm:sp3d/>
+    <dgm:txPr/>
+    <dgm:style>
+      <a:lnRef idx="1">
+        <a:scrgbClr r="0" g="0" b="0"/>
+      </a:lnRef>
+      <a:fillRef idx="1">
+        <a:scrgbClr r="0" g="0" b="0"/>
+      </a:fillRef>
+      <a:effectRef idx="0">
+        <a:scrgbClr r="0" g="0" b="0"/>
+      </a:effectRef>
+      <a:fontRef idx="minor"/>
+    </dgm:style>
+  </dgm:styleLbl>
+  <dgm:styleLbl name="bgAccFollowNode1">
+    <dgm:scene3d>
+      <a:camera prst="orthographicFront"/>
+      <a:lightRig rig="threePt" dir="t"/>
+    </dgm:scene3d>
+    <dgm:sp3d/>
+    <dgm:txPr/>
+    <dgm:style>
+      <a:lnRef idx="1">
+        <a:scrgbClr r="0" g="0" b="0"/>
+      </a:lnRef>
+      <a:fillRef idx="1">
+        <a:scrgbClr r="0" g="0" b="0"/>
+      </a:fillRef>
+      <a:effectRef idx="0">
+        <a:scrgbClr r="0" g="0" b="0"/>
+      </a:effectRef>
+      <a:fontRef idx="minor"/>
+    </dgm:style>
+  </dgm:styleLbl>
+  <dgm:styleLbl name="fgAcc0">
+    <dgm:scene3d>
+      <a:camera prst="orthographicFront"/>
+      <a:lightRig rig="threePt" dir="t"/>
+    </dgm:scene3d>
+    <dgm:sp3d/>
+    <dgm:txPr/>
+    <dgm:style>
+      <a:lnRef idx="1">
+        <a:scrgbClr r="0" g="0" b="0"/>
+      </a:lnRef>
+      <a:fillRef idx="1">
+        <a:scrgbClr r="0" g="0" b="0"/>
+      </a:fillRef>
+      <a:effectRef idx="0">
+        <a:scrgbClr r="0" g="0" b="0"/>
+      </a:effectRef>
+      <a:fontRef idx="minor"/>
+    </dgm:style>
+  </dgm:styleLbl>
+  <dgm:styleLbl name="fgAcc2">
+    <dgm:scene3d>
+      <a:camera prst="orthographicFront"/>
+      <a:lightRig rig="threePt" dir="t"/>
+    </dgm:scene3d>
+    <dgm:sp3d/>
+    <dgm:txPr/>
+    <dgm:style>
+      <a:lnRef idx="1">
+        <a:scrgbClr r="0" g="0" b="0"/>
+      </a:lnRef>
+      <a:fillRef idx="1">
+        <a:scrgbClr r="0" g="0" b="0"/>
+      </a:fillRef>
+      <a:effectRef idx="0">
+        <a:scrgbClr r="0" g="0" b="0"/>
+      </a:effectRef>
+      <a:fontRef idx="minor"/>
+    </dgm:style>
+  </dgm:styleLbl>
+  <dgm:styleLbl name="fgAcc3">
+    <dgm:scene3d>
+      <a:camera prst="orthographicFront"/>
+      <a:lightRig rig="threePt" dir="t"/>
+    </dgm:scene3d>
+    <dgm:sp3d/>
+    <dgm:txPr/>
+    <dgm:style>
+      <a:lnRef idx="1">
+        <a:scrgbClr r="0" g="0" b="0"/>
+      </a:lnRef>
+      <a:fillRef idx="1">
+        <a:scrgbClr r="0" g="0" b="0"/>
+      </a:fillRef>
+      <a:effectRef idx="0">
+        <a:scrgbClr r="0" g="0" b="0"/>
+      </a:effectRef>
+      <a:fontRef idx="minor"/>
+    </dgm:style>
+  </dgm:styleLbl>
+  <dgm:styleLbl name="fgAcc4">
+    <dgm:scene3d>
+      <a:camera prst="orthographicFront"/>
+      <a:lightRig rig="threePt" dir="t"/>
+    </dgm:scene3d>
+    <dgm:sp3d/>
+    <dgm:txPr/>
+    <dgm:style>
+      <a:lnRef idx="1">
+        <a:scrgbClr r="0" g="0" b="0"/>
+      </a:lnRef>
+      <a:fillRef idx="1">
+        <a:scrgbClr r="0" g="0" b="0"/>
+      </a:fillRef>
+      <a:effectRef idx="0">
+        <a:scrgbClr r="0" g="0" b="0"/>
+      </a:effectRef>
+      <a:fontRef idx="minor"/>
+    </dgm:style>
+  </dgm:styleLbl>
+  <dgm:styleLbl name="bgShp">
+    <dgm:scene3d>
+      <a:camera prst="orthographicFront"/>
+      <a:lightRig rig="threePt" dir="t"/>
+    </dgm:scene3d>
+    <dgm:sp3d/>
+    <dgm:txPr/>
+    <dgm:style>
+      <a:lnRef idx="0">
+        <a:scrgbClr r="0" g="0" b="0"/>
+      </a:lnRef>
+      <a:fillRef idx="1">
+        <a:scrgbClr r="0" g="0" b="0"/>
+      </a:fillRef>
+      <a:effectRef idx="2">
+        <a:scrgbClr r="0" g="0" b="0"/>
+      </a:effectRef>
+      <a:fontRef idx="minor"/>
+    </dgm:style>
+  </dgm:styleLbl>
+  <dgm:styleLbl name="dkBgShp">
+    <dgm:scene3d>
+      <a:camera prst="orthographicFront"/>
+      <a:lightRig rig="threePt" dir="t"/>
+    </dgm:scene3d>
+    <dgm:sp3d/>
+    <dgm:txPr/>
+    <dgm:style>
+      <a:lnRef idx="0">
+        <a:scrgbClr r="0" g="0" b="0"/>
+      </a:lnRef>
+      <a:fillRef idx="1">
+        <a:scrgbClr r="0" g="0" b="0"/>
+      </a:fillRef>
+      <a:effectRef idx="2">
+        <a:scrgbClr r="0" g="0" b="0"/>
+      </a:effectRef>
+      <a:fontRef idx="minor"/>
+    </dgm:style>
+  </dgm:styleLbl>
+  <dgm:styleLbl name="trBgShp">
+    <dgm:scene3d>
+      <a:camera prst="orthographicFront"/>
+      <a:lightRig rig="threePt" dir="t"/>
+    </dgm:scene3d>
+    <dgm:sp3d/>
+    <dgm:txPr/>
+    <dgm:style>
+      <a:lnRef idx="0">
+        <a:scrgbClr r="0" g="0" b="0"/>
+      </a:lnRef>
+      <a:fillRef idx="1">
+        <a:scrgbClr r="0" g="0" b="0"/>
+      </a:fillRef>
+      <a:effectRef idx="0">
+        <a:scrgbClr r="0" g="0" b="0"/>
+      </a:effectRef>
+      <a:fontRef idx="minor"/>
+    </dgm:style>
+  </dgm:styleLbl>
+  <dgm:styleLbl name="fgShp">
+    <dgm:scene3d>
+      <a:camera prst="orthographicFront"/>
+      <a:lightRig rig="threePt" dir="t"/>
+    </dgm:scene3d>
+    <dgm:sp3d/>
+    <dgm:txPr/>
+    <dgm:style>
+      <a:lnRef idx="0">
+        <a:scrgbClr r="0" g="0" b="0"/>
+      </a:lnRef>
+      <a:fillRef idx="3">
+        <a:scrgbClr r="0" g="0" b="0"/>
+      </a:fillRef>
+      <a:effectRef idx="2">
+        <a:scrgbClr r="0" g="0" b="0"/>
+      </a:effectRef>
+      <a:fontRef idx="minor"/>
+    </dgm:style>
+  </dgm:styleLbl>
+  <dgm:styleLbl name="revTx">
+    <dgm:scene3d>
+      <a:camera prst="orthographicFront"/>
+      <a:lightRig rig="threePt" dir="t"/>
+    </dgm:scene3d>
+    <dgm:sp3d/>
+    <dgm:txPr/>
+    <dgm:style>
+      <a:lnRef idx="0">
+        <a:scrgbClr r="0" g="0" b="0"/>
+      </a:lnRef>
+      <a:fillRef idx="0">
+        <a:scrgbClr r="0" g="0" b="0"/>
+      </a:fillRef>
+      <a:effectRef idx="0">
+        <a:scrgbClr r="0" g="0" b="0"/>
+      </a:effectRef>
+      <a:fontRef idx="minor"/>
+    </dgm:style>
+  </dgm:styleLbl>
+</dgm:styleDef>
 </file>
 
 <file path=ppt/slideLayouts/slideLayout1.xml><?xml version="1.0" encoding="utf-8"?>
@@ -622,7 +3425,11 @@
           <a:p>
             <a:r>
               <a:rPr lang="en-US" dirty="0" smtClean="0"/>
-              <a:t>Shape 1</a:t>
+              <a:t>s</a:t>
+            </a:r>
+            <a:r>
+              <a:rPr lang="en-US" dirty="0" smtClean="0"/>
+              <a:t>hapes[0]</a:t>
             </a:r>
             <a:endParaRPr lang="en-US" dirty="0"/>
           </a:p>
@@ -638,22 +3445,38 @@
             <p:ph sz="quarter" idx="10"/>
           </p:nvPr>
         </p:nvSpPr>
-        <p:spPr/>
+        <p:spPr>
+          <a:xfrm>
+            <a:off x="468313" y="1628775"/>
+            <a:ext cx="4103687" cy="1728217"/>
+          </a:xfrm>
+        </p:spPr>
         <p:txBody>
-          <a:bodyPr/>
+          <a:bodyPr>
+            <a:normAutofit/>
+          </a:bodyPr>
           <a:lstStyle/>
           <a:p>
             <a:r>
-              <a:rPr lang="en-US" dirty="0" smtClean="0"/>
-              <a:t>Shape 2</a:t>
+              <a:rPr lang="en-US" sz="2000" dirty="0" smtClean="0"/>
+              <a:t>s</a:t>
             </a:r>
+            <a:r>
+              <a:rPr lang="en-US" sz="2000" dirty="0" smtClean="0"/>
+              <a:t>hapes[1]</a:t>
+            </a:r>
+            <a:endParaRPr lang="en-US" sz="2000" dirty="0" smtClean="0"/>
           </a:p>
           <a:p>
             <a:r>
-              <a:rPr lang="en-US" dirty="0" smtClean="0"/>
-              <a:t>Picture is Shape 3</a:t>
+              <a:rPr lang="en-US" sz="2000" dirty="0" smtClean="0"/>
+              <a:t>Picture is </a:t>
             </a:r>
-            <a:endParaRPr lang="en-US" dirty="0"/>
+            <a:r>
+              <a:rPr lang="en-US" sz="2000" dirty="0" smtClean="0"/>
+              <a:t>shapes[2]</a:t>
+            </a:r>
+            <a:endParaRPr lang="en-US" sz="2000" dirty="0"/>
           </a:p>
         </p:txBody>
       </p:sp>
@@ -687,6 +3510,130 @@
           </a:prstGeom>
         </p:spPr>
       </p:pic>
+      <p:graphicFrame>
+        <p:nvGraphicFramePr>
+          <p:cNvPr id="2" name="Table 1"/>
+          <p:cNvGraphicFramePr>
+            <a:graphicFrameLocks noGrp="1"/>
+          </p:cNvGraphicFramePr>
+          <p:nvPr>
+            <p:extLst>
+              <p:ext uri="{D42A27DB-BD31-4B8C-83A1-F6EECF244321}">
+                <p14:modId xmlns:p14="http://schemas.microsoft.com/office/powerpoint/2010/main" val="483364833"/>
+              </p:ext>
+            </p:extLst>
+          </p:nvPr>
+        </p:nvGraphicFramePr>
+        <p:xfrm>
+          <a:off x="4788024" y="1916832"/>
+          <a:ext cx="3816424" cy="741680"/>
+        </p:xfrm>
+        <a:graphic>
+          <a:graphicData uri="http://schemas.openxmlformats.org/drawingml/2006/table">
+            <a:tbl>
+              <a:tblPr firstRow="1" bandRow="1">
+                <a:tableStyleId>{5C22544A-7EE6-4342-B048-85BDC9FD1C3A}</a:tableStyleId>
+              </a:tblPr>
+              <a:tblGrid>
+                <a:gridCol w="1908212"/>
+                <a:gridCol w="1908212"/>
+              </a:tblGrid>
+              <a:tr h="370840">
+                <a:tc>
+                  <a:txBody>
+                    <a:bodyPr/>
+                    <a:lstStyle/>
+                    <a:p>
+                      <a:r>
+                        <a:rPr lang="en-US" dirty="0" smtClean="0"/>
+                        <a:t>shapes[3]</a:t>
+                      </a:r>
+                      <a:endParaRPr lang="en-US" dirty="0"/>
+                    </a:p>
+                  </a:txBody>
+                  <a:tcPr/>
+                </a:tc>
+                <a:tc>
+                  <a:txBody>
+                    <a:bodyPr/>
+                    <a:lstStyle/>
+                    <a:p>
+                      <a:endParaRPr lang="en-US"/>
+                    </a:p>
+                  </a:txBody>
+                  <a:tcPr/>
+                </a:tc>
+              </a:tr>
+              <a:tr h="370840">
+                <a:tc>
+                  <a:txBody>
+                    <a:bodyPr/>
+                    <a:lstStyle/>
+                    <a:p>
+                      <a:endParaRPr lang="en-US"/>
+                    </a:p>
+                  </a:txBody>
+                  <a:tcPr/>
+                </a:tc>
+                <a:tc>
+                  <a:txBody>
+                    <a:bodyPr/>
+                    <a:lstStyle/>
+                    <a:p>
+                      <a:endParaRPr lang="en-US" dirty="0"/>
+                    </a:p>
+                  </a:txBody>
+                  <a:tcPr/>
+                </a:tc>
+              </a:tr>
+            </a:tbl>
+          </a:graphicData>
+        </a:graphic>
+      </p:graphicFrame>
+      <p:graphicFrame>
+        <p:nvGraphicFramePr>
+          <p:cNvPr id="3" name="Chart 2"/>
+          <p:cNvGraphicFramePr/>
+          <p:nvPr>
+            <p:extLst>
+              <p:ext uri="{D42A27DB-BD31-4B8C-83A1-F6EECF244321}">
+                <p14:modId xmlns:p14="http://schemas.microsoft.com/office/powerpoint/2010/main" val="547766558"/>
+              </p:ext>
+            </p:extLst>
+          </p:nvPr>
+        </p:nvGraphicFramePr>
+        <p:xfrm>
+          <a:off x="467544" y="3501008"/>
+          <a:ext cx="3816424" cy="1959992"/>
+        </p:xfrm>
+        <a:graphic>
+          <a:graphicData uri="http://schemas.openxmlformats.org/drawingml/2006/chart">
+            <c:chart xmlns:c="http://schemas.openxmlformats.org/drawingml/2006/chart" xmlns:r="http://schemas.openxmlformats.org/officeDocument/2006/relationships" r:id="rId3"/>
+          </a:graphicData>
+        </a:graphic>
+      </p:graphicFrame>
+      <p:graphicFrame>
+        <p:nvGraphicFramePr>
+          <p:cNvPr id="8" name="Diagram 7"/>
+          <p:cNvGraphicFramePr/>
+          <p:nvPr>
+            <p:extLst>
+              <p:ext uri="{D42A27DB-BD31-4B8C-83A1-F6EECF244321}">
+                <p14:modId xmlns:p14="http://schemas.microsoft.com/office/powerpoint/2010/main" val="321323770"/>
+              </p:ext>
+            </p:extLst>
+          </p:nvPr>
+        </p:nvGraphicFramePr>
+        <p:xfrm>
+          <a:off x="4788024" y="3501008"/>
+          <a:ext cx="3816424" cy="2304256"/>
+        </p:xfrm>
+        <a:graphic>
+          <a:graphicData uri="http://schemas.openxmlformats.org/drawingml/2006/diagram">
+            <dgm:relIds xmlns:dgm="http://schemas.openxmlformats.org/drawingml/2006/diagram" xmlns:r="http://schemas.openxmlformats.org/officeDocument/2006/relationships" r:dm="rId4" r:lo="rId5" r:qs="rId6" r:cs="rId7"/>
+          </a:graphicData>
+        </a:graphic>
+      </p:graphicFrame>
     </p:spTree>
     <p:extLst>
       <p:ext uri="{BB962C8B-B14F-4D97-AF65-F5344CB8AC3E}">

</xml_diff>